<commit_message>
data from Julien Papaix to run models
</commit_message>
<xml_diff>
--- a/manuscript/figures mortalité.pptx
+++ b/manuscript/figures mortalité.pptx
@@ -199,7 +199,7 @@
           <a:p>
             <a:fld id="{960BA4E2-E87E-4FA5-993B-DCC6DA522014}" type="datetimeFigureOut">
               <a:rPr lang="fr-FR" smtClean="0"/>
-              <a:t>26/08/2025</a:t>
+              <a:t>01/09/2025</a:t>
             </a:fld>
             <a:endParaRPr lang="fr-FR"/>
           </a:p>
@@ -550,6 +550,90 @@
 </p:notes>
 </file>
 
+<file path=ppt/notesSlides/notesSlide2.xml><?xml version="1.0" encoding="utf-8"?>
+<p:notes xmlns:a="http://schemas.openxmlformats.org/drawingml/2006/main" xmlns:r="http://schemas.openxmlformats.org/officeDocument/2006/relationships" xmlns:p="http://schemas.openxmlformats.org/presentationml/2006/main">
+  <p:cSld>
+    <p:spTree>
+      <p:nvGrpSpPr>
+        <p:cNvPr id="1" name=""/>
+        <p:cNvGrpSpPr/>
+        <p:nvPr/>
+      </p:nvGrpSpPr>
+      <p:grpSpPr>
+        <a:xfrm>
+          <a:off x="0" y="0"/>
+          <a:ext cx="0" cy="0"/>
+          <a:chOff x="0" y="0"/>
+          <a:chExt cx="0" cy="0"/>
+        </a:xfrm>
+      </p:grpSpPr>
+      <p:sp>
+        <p:nvSpPr>
+          <p:cNvPr id="2" name="Espace réservé de l'image des diapositives 1"/>
+          <p:cNvSpPr>
+            <a:spLocks noGrp="1" noRot="1" noChangeAspect="1"/>
+          </p:cNvSpPr>
+          <p:nvPr>
+            <p:ph type="sldImg"/>
+          </p:nvPr>
+        </p:nvSpPr>
+        <p:spPr/>
+      </p:sp>
+      <p:sp>
+        <p:nvSpPr>
+          <p:cNvPr id="3" name="Espace réservé des notes 2"/>
+          <p:cNvSpPr>
+            <a:spLocks noGrp="1"/>
+          </p:cNvSpPr>
+          <p:nvPr>
+            <p:ph type="body" idx="1"/>
+          </p:nvPr>
+        </p:nvSpPr>
+        <p:spPr/>
+        <p:txBody>
+          <a:bodyPr/>
+          <a:lstStyle/>
+          <a:p>
+            <a:endParaRPr lang="fr-FR" dirty="0"/>
+          </a:p>
+        </p:txBody>
+      </p:sp>
+      <p:sp>
+        <p:nvSpPr>
+          <p:cNvPr id="4" name="Espace réservé du numéro de diapositive 3"/>
+          <p:cNvSpPr>
+            <a:spLocks noGrp="1"/>
+          </p:cNvSpPr>
+          <p:nvPr>
+            <p:ph type="sldNum" sz="quarter" idx="5"/>
+          </p:nvPr>
+        </p:nvSpPr>
+        <p:spPr/>
+        <p:txBody>
+          <a:bodyPr/>
+          <a:lstStyle/>
+          <a:p>
+            <a:fld id="{5007794C-D012-40F8-AB55-A938D24C4DAC}" type="slidenum">
+              <a:rPr lang="fr-FR" smtClean="0"/>
+              <a:t>3</a:t>
+            </a:fld>
+            <a:endParaRPr lang="fr-FR"/>
+          </a:p>
+        </p:txBody>
+      </p:sp>
+    </p:spTree>
+    <p:extLst>
+      <p:ext uri="{BB962C8B-B14F-4D97-AF65-F5344CB8AC3E}">
+        <p14:creationId xmlns:p14="http://schemas.microsoft.com/office/powerpoint/2010/main" val="349351449"/>
+      </p:ext>
+    </p:extLst>
+  </p:cSld>
+  <p:clrMapOvr>
+    <a:masterClrMapping/>
+  </p:clrMapOvr>
+</p:notes>
+</file>
+
 <file path=ppt/slideLayouts/slideLayout1.xml><?xml version="1.0" encoding="utf-8"?>
 <p:sldLayout xmlns:a="http://schemas.openxmlformats.org/drawingml/2006/main" xmlns:r="http://schemas.openxmlformats.org/officeDocument/2006/relationships" xmlns:p="http://schemas.openxmlformats.org/presentationml/2006/main" type="title" preserve="1">
   <p:cSld name="Diapositive de titre">
@@ -697,7 +781,7 @@
           <a:p>
             <a:fld id="{98AF086C-B887-42A7-A6F3-187A52C1EDB5}" type="datetimeFigureOut">
               <a:rPr lang="fr-FR" smtClean="0"/>
-              <a:t>26/08/2025</a:t>
+              <a:t>01/09/2025</a:t>
             </a:fld>
             <a:endParaRPr lang="fr-FR"/>
           </a:p>
@@ -895,7 +979,7 @@
           <a:p>
             <a:fld id="{98AF086C-B887-42A7-A6F3-187A52C1EDB5}" type="datetimeFigureOut">
               <a:rPr lang="fr-FR" smtClean="0"/>
-              <a:t>26/08/2025</a:t>
+              <a:t>01/09/2025</a:t>
             </a:fld>
             <a:endParaRPr lang="fr-FR"/>
           </a:p>
@@ -1103,7 +1187,7 @@
           <a:p>
             <a:fld id="{98AF086C-B887-42A7-A6F3-187A52C1EDB5}" type="datetimeFigureOut">
               <a:rPr lang="fr-FR" smtClean="0"/>
-              <a:t>26/08/2025</a:t>
+              <a:t>01/09/2025</a:t>
             </a:fld>
             <a:endParaRPr lang="fr-FR"/>
           </a:p>
@@ -1301,7 +1385,7 @@
           <a:p>
             <a:fld id="{98AF086C-B887-42A7-A6F3-187A52C1EDB5}" type="datetimeFigureOut">
               <a:rPr lang="fr-FR" smtClean="0"/>
-              <a:t>26/08/2025</a:t>
+              <a:t>01/09/2025</a:t>
             </a:fld>
             <a:endParaRPr lang="fr-FR"/>
           </a:p>
@@ -1576,7 +1660,7 @@
           <a:p>
             <a:fld id="{98AF086C-B887-42A7-A6F3-187A52C1EDB5}" type="datetimeFigureOut">
               <a:rPr lang="fr-FR" smtClean="0"/>
-              <a:t>26/08/2025</a:t>
+              <a:t>01/09/2025</a:t>
             </a:fld>
             <a:endParaRPr lang="fr-FR"/>
           </a:p>
@@ -1841,7 +1925,7 @@
           <a:p>
             <a:fld id="{98AF086C-B887-42A7-A6F3-187A52C1EDB5}" type="datetimeFigureOut">
               <a:rPr lang="fr-FR" smtClean="0"/>
-              <a:t>26/08/2025</a:t>
+              <a:t>01/09/2025</a:t>
             </a:fld>
             <a:endParaRPr lang="fr-FR"/>
           </a:p>
@@ -2253,7 +2337,7 @@
           <a:p>
             <a:fld id="{98AF086C-B887-42A7-A6F3-187A52C1EDB5}" type="datetimeFigureOut">
               <a:rPr lang="fr-FR" smtClean="0"/>
-              <a:t>26/08/2025</a:t>
+              <a:t>01/09/2025</a:t>
             </a:fld>
             <a:endParaRPr lang="fr-FR"/>
           </a:p>
@@ -2394,7 +2478,7 @@
           <a:p>
             <a:fld id="{98AF086C-B887-42A7-A6F3-187A52C1EDB5}" type="datetimeFigureOut">
               <a:rPr lang="fr-FR" smtClean="0"/>
-              <a:t>26/08/2025</a:t>
+              <a:t>01/09/2025</a:t>
             </a:fld>
             <a:endParaRPr lang="fr-FR"/>
           </a:p>
@@ -2507,7 +2591,7 @@
           <a:p>
             <a:fld id="{98AF086C-B887-42A7-A6F3-187A52C1EDB5}" type="datetimeFigureOut">
               <a:rPr lang="fr-FR" smtClean="0"/>
-              <a:t>26/08/2025</a:t>
+              <a:t>01/09/2025</a:t>
             </a:fld>
             <a:endParaRPr lang="fr-FR"/>
           </a:p>
@@ -2818,7 +2902,7 @@
           <a:p>
             <a:fld id="{98AF086C-B887-42A7-A6F3-187A52C1EDB5}" type="datetimeFigureOut">
               <a:rPr lang="fr-FR" smtClean="0"/>
-              <a:t>26/08/2025</a:t>
+              <a:t>01/09/2025</a:t>
             </a:fld>
             <a:endParaRPr lang="fr-FR"/>
           </a:p>
@@ -3106,7 +3190,7 @@
           <a:p>
             <a:fld id="{98AF086C-B887-42A7-A6F3-187A52C1EDB5}" type="datetimeFigureOut">
               <a:rPr lang="fr-FR" smtClean="0"/>
-              <a:t>26/08/2025</a:t>
+              <a:t>01/09/2025</a:t>
             </a:fld>
             <a:endParaRPr lang="fr-FR"/>
           </a:p>
@@ -3347,7 +3431,7 @@
           <a:p>
             <a:fld id="{98AF086C-B887-42A7-A6F3-187A52C1EDB5}" type="datetimeFigureOut">
               <a:rPr lang="fr-FR" smtClean="0"/>
-              <a:t>26/08/2025</a:t>
+              <a:t>01/09/2025</a:t>
             </a:fld>
             <a:endParaRPr lang="fr-FR"/>
           </a:p>
@@ -10068,14 +10152,272 @@
           <a:chExt cx="0" cy="0"/>
         </a:xfrm>
       </p:grpSpPr>
+      <p:sp>
+        <p:nvSpPr>
+          <p:cNvPr id="137" name="Ellipse 136">
+            <a:extLst>
+              <a:ext uri="{FF2B5EF4-FFF2-40B4-BE49-F238E27FC236}">
+                <a16:creationId xmlns:a16="http://schemas.microsoft.com/office/drawing/2014/main" id="{FA460C05-D8BD-7E6C-258E-F4E5DAFB06EA}"/>
+              </a:ext>
+            </a:extLst>
+          </p:cNvPr>
+          <p:cNvSpPr/>
+          <p:nvPr/>
+        </p:nvSpPr>
+        <p:spPr>
+          <a:xfrm>
+            <a:off x="3410763" y="2720246"/>
+            <a:ext cx="2686444" cy="1232043"/>
+          </a:xfrm>
+          <a:prstGeom prst="ellipse">
+            <a:avLst/>
+          </a:prstGeom>
+          <a:solidFill>
+            <a:schemeClr val="accent1">
+              <a:lumMod val="75000"/>
+            </a:schemeClr>
+          </a:solidFill>
+        </p:spPr>
+        <p:style>
+          <a:lnRef idx="2">
+            <a:schemeClr val="accent1">
+              <a:shade val="15000"/>
+            </a:schemeClr>
+          </a:lnRef>
+          <a:fillRef idx="1">
+            <a:schemeClr val="accent1"/>
+          </a:fillRef>
+          <a:effectRef idx="0">
+            <a:schemeClr val="accent1"/>
+          </a:effectRef>
+          <a:fontRef idx="minor">
+            <a:schemeClr val="lt1"/>
+          </a:fontRef>
+        </p:style>
+        <p:txBody>
+          <a:bodyPr rtlCol="0" anchor="t"/>
+          <a:lstStyle/>
+          <a:p>
+            <a:pPr algn="ctr"/>
+            <a:r>
+              <a:rPr lang="fr-FR" b="1" dirty="0">
+                <a:solidFill>
+                  <a:schemeClr val="bg1"/>
+                </a:solidFill>
+              </a:rPr>
+              <a:t>Risk model</a:t>
+            </a:r>
+          </a:p>
+        </p:txBody>
+      </p:sp>
+      <p:sp>
+        <p:nvSpPr>
+          <p:cNvPr id="88" name="Ellipse 87">
+            <a:extLst>
+              <a:ext uri="{FF2B5EF4-FFF2-40B4-BE49-F238E27FC236}">
+                <a16:creationId xmlns:a16="http://schemas.microsoft.com/office/drawing/2014/main" id="{02620B02-6606-D076-25D0-0046FA134FBF}"/>
+              </a:ext>
+            </a:extLst>
+          </p:cNvPr>
+          <p:cNvSpPr/>
+          <p:nvPr/>
+        </p:nvSpPr>
+        <p:spPr>
+          <a:xfrm>
+            <a:off x="3116946" y="227860"/>
+            <a:ext cx="3082781" cy="1567448"/>
+          </a:xfrm>
+          <a:prstGeom prst="ellipse">
+            <a:avLst/>
+          </a:prstGeom>
+          <a:solidFill>
+            <a:srgbClr val="F2DCB4"/>
+          </a:solidFill>
+        </p:spPr>
+        <p:style>
+          <a:lnRef idx="2">
+            <a:schemeClr val="accent1">
+              <a:shade val="15000"/>
+            </a:schemeClr>
+          </a:lnRef>
+          <a:fillRef idx="1">
+            <a:schemeClr val="accent1"/>
+          </a:fillRef>
+          <a:effectRef idx="0">
+            <a:schemeClr val="accent1"/>
+          </a:effectRef>
+          <a:fontRef idx="minor">
+            <a:schemeClr val="lt1"/>
+          </a:fontRef>
+        </p:style>
+        <p:txBody>
+          <a:bodyPr rtlCol="0" anchor="t"/>
+          <a:lstStyle/>
+          <a:p>
+            <a:pPr algn="ctr"/>
+            <a:r>
+              <a:rPr lang="fr-FR" b="1" dirty="0">
+                <a:solidFill>
+                  <a:schemeClr val="tx1"/>
+                </a:solidFill>
+              </a:rPr>
+              <a:t>Spatial </a:t>
+            </a:r>
+            <a:r>
+              <a:rPr lang="fr-FR" b="1" dirty="0" err="1">
+                <a:solidFill>
+                  <a:schemeClr val="tx1"/>
+                </a:solidFill>
+              </a:rPr>
+              <a:t>random</a:t>
+            </a:r>
+            <a:r>
+              <a:rPr lang="fr-FR" b="1" dirty="0">
+                <a:solidFill>
+                  <a:schemeClr val="tx1"/>
+                </a:solidFill>
+              </a:rPr>
+              <a:t> </a:t>
+            </a:r>
+            <a:r>
+              <a:rPr lang="fr-FR" b="1" dirty="0" err="1">
+                <a:solidFill>
+                  <a:schemeClr val="tx1"/>
+                </a:solidFill>
+              </a:rPr>
+              <a:t>effects</a:t>
+            </a:r>
+            <a:endParaRPr lang="fr-FR" b="1" dirty="0">
+              <a:solidFill>
+                <a:schemeClr val="tx1"/>
+              </a:solidFill>
+            </a:endParaRPr>
+          </a:p>
+        </p:txBody>
+      </p:sp>
+      <p:grpSp>
+        <p:nvGrpSpPr>
+          <p:cNvPr id="51" name="Groupe 50">
+            <a:extLst>
+              <a:ext uri="{FF2B5EF4-FFF2-40B4-BE49-F238E27FC236}">
+                <a16:creationId xmlns:a16="http://schemas.microsoft.com/office/drawing/2014/main" id="{E3E69A7A-210D-C273-AD2D-66121636A316}"/>
+              </a:ext>
+            </a:extLst>
+          </p:cNvPr>
+          <p:cNvGrpSpPr/>
+          <p:nvPr/>
+        </p:nvGrpSpPr>
+        <p:grpSpPr>
+          <a:xfrm>
+            <a:off x="3076057" y="4555921"/>
+            <a:ext cx="2682215" cy="1022266"/>
+            <a:chOff x="2508911" y="3777072"/>
+            <a:chExt cx="2682215" cy="1022266"/>
+          </a:xfrm>
+          <a:solidFill>
+            <a:srgbClr val="FFFFFF"/>
+          </a:solidFill>
+        </p:grpSpPr>
+        <p:sp>
+          <p:nvSpPr>
+            <p:cNvPr id="52" name="Rectangle : coins arrondis 51">
+              <a:extLst>
+                <a:ext uri="{FF2B5EF4-FFF2-40B4-BE49-F238E27FC236}">
+                  <a16:creationId xmlns:a16="http://schemas.microsoft.com/office/drawing/2014/main" id="{15B2AE7B-9E00-D8CD-C8AA-0EE22FB6C4FD}"/>
+                </a:ext>
+              </a:extLst>
+            </p:cNvPr>
+            <p:cNvSpPr/>
+            <p:nvPr/>
+          </p:nvSpPr>
+          <p:spPr>
+            <a:xfrm>
+              <a:off x="2508911" y="3777072"/>
+              <a:ext cx="2682215" cy="1022266"/>
+            </a:xfrm>
+            <a:prstGeom prst="roundRect">
+              <a:avLst/>
+            </a:prstGeom>
+            <a:grpFill/>
+          </p:spPr>
+          <p:style>
+            <a:lnRef idx="2">
+              <a:schemeClr val="accent1">
+                <a:shade val="15000"/>
+              </a:schemeClr>
+            </a:lnRef>
+            <a:fillRef idx="1">
+              <a:schemeClr val="accent1"/>
+            </a:fillRef>
+            <a:effectRef idx="0">
+              <a:schemeClr val="accent1"/>
+            </a:effectRef>
+            <a:fontRef idx="minor">
+              <a:schemeClr val="lt1"/>
+            </a:fontRef>
+          </p:style>
+          <p:txBody>
+            <a:bodyPr rtlCol="0" anchor="ctr"/>
+            <a:lstStyle/>
+            <a:p>
+              <a:pPr algn="ctr"/>
+              <a:endParaRPr lang="fr-FR">
+                <a:solidFill>
+                  <a:schemeClr val="tx1"/>
+                </a:solidFill>
+              </a:endParaRPr>
+            </a:p>
+          </p:txBody>
+        </p:sp>
+        <p:sp>
+          <p:nvSpPr>
+            <p:cNvPr id="55" name="ZoneTexte 54">
+              <a:extLst>
+                <a:ext uri="{FF2B5EF4-FFF2-40B4-BE49-F238E27FC236}">
+                  <a16:creationId xmlns:a16="http://schemas.microsoft.com/office/drawing/2014/main" id="{A8BB3174-9AEA-4D2D-3B20-DAC6CDAAC7DA}"/>
+                </a:ext>
+              </a:extLst>
+            </p:cNvPr>
+            <p:cNvSpPr txBox="1"/>
+            <p:nvPr/>
+          </p:nvSpPr>
+          <p:spPr>
+            <a:xfrm>
+              <a:off x="2628545" y="3801850"/>
+              <a:ext cx="2431304" cy="369332"/>
+            </a:xfrm>
+            <a:prstGeom prst="rect">
+              <a:avLst/>
+            </a:prstGeom>
+            <a:grpFill/>
+          </p:spPr>
+          <p:txBody>
+            <a:bodyPr wrap="square" rtlCol="0">
+              <a:spAutoFit/>
+            </a:bodyPr>
+            <a:lstStyle/>
+            <a:p>
+              <a:pPr algn="ctr"/>
+              <a:r>
+                <a:rPr lang="fr-FR" b="1" dirty="0" err="1"/>
+                <a:t>Observed</a:t>
+              </a:r>
+              <a:r>
+                <a:rPr lang="fr-FR" b="1" dirty="0"/>
+                <a:t> data</a:t>
+              </a:r>
+            </a:p>
+          </p:txBody>
+        </p:sp>
+      </p:grpSp>
       <mc:AlternateContent xmlns:mc="http://schemas.openxmlformats.org/markup-compatibility/2006">
         <mc:Choice xmlns:a14="http://schemas.microsoft.com/office/drawing/2010/main" Requires="a14">
           <p:sp>
             <p:nvSpPr>
-              <p:cNvPr id="5" name="ZoneTexte 4">
+              <p:cNvPr id="7" name="ZoneTexte 6">
                 <a:extLst>
                   <a:ext uri="{FF2B5EF4-FFF2-40B4-BE49-F238E27FC236}">
-                    <a16:creationId xmlns:a16="http://schemas.microsoft.com/office/drawing/2014/main" id="{8A10CA1A-8BD0-3151-3D8C-E231B70E004B}"/>
+                    <a16:creationId xmlns:a16="http://schemas.microsoft.com/office/drawing/2014/main" id="{79AD8DED-4E25-D0DE-53C9-DCC01A690A3B}"/>
                   </a:ext>
                 </a:extLst>
               </p:cNvPr>
@@ -10084,8 +10426,8 @@
             </p:nvSpPr>
             <p:spPr>
               <a:xfrm>
-                <a:off x="2171700" y="4290868"/>
-                <a:ext cx="2857500" cy="384464"/>
+                <a:off x="2928993" y="5038876"/>
+                <a:ext cx="1384300" cy="361959"/>
               </a:xfrm>
               <a:prstGeom prst="rect">
                 <a:avLst/>
@@ -10108,275 +10450,14 @@
                       <m:sSubSup>
                         <m:sSubSupPr>
                           <m:ctrlPr>
-                            <a:rPr lang="fr-FR" i="1" smtClean="0">
+                            <a:rPr lang="fr-FR" sz="1400" i="1" smtClean="0">
                               <a:latin typeface="Cambria Math" panose="02040503050406030204" pitchFamily="18" charset="0"/>
                             </a:rPr>
                           </m:ctrlPr>
                         </m:sSubSupPr>
                         <m:e>
                           <m:r>
-                            <m:rPr>
-                              <m:sty m:val="p"/>
-                            </m:rPr>
-                            <a:rPr lang="fr-FR">
-                              <a:latin typeface="Cambria Math" panose="02040503050406030204" pitchFamily="18" charset="0"/>
-                            </a:rPr>
-                            <m:t>Λ</m:t>
-                          </m:r>
-                        </m:e>
-                        <m:sub>
-                          <m:r>
-                            <a:rPr lang="fr-FR" i="1">
-                              <a:latin typeface="Cambria Math" panose="02040503050406030204" pitchFamily="18" charset="0"/>
-                            </a:rPr>
-                            <m:t>𝑖</m:t>
-                          </m:r>
-                        </m:sub>
-                        <m:sup>
-                          <m:r>
-                            <a:rPr lang="fr-FR" i="1">
-                              <a:latin typeface="Cambria Math" panose="02040503050406030204" pitchFamily="18" charset="0"/>
-                            </a:rPr>
-                            <m:t>𝑅</m:t>
-                          </m:r>
-                        </m:sup>
-                      </m:sSubSup>
-                      <m:d>
-                        <m:dPr>
-                          <m:ctrlPr>
-                            <a:rPr lang="fr-FR" i="1">
-                              <a:latin typeface="Cambria Math" panose="02040503050406030204" pitchFamily="18" charset="0"/>
-                            </a:rPr>
-                          </m:ctrlPr>
-                        </m:dPr>
-                        <m:e>
-                          <m:r>
-                            <a:rPr lang="fr-FR" i="1">
-                              <a:latin typeface="Cambria Math" panose="02040503050406030204" pitchFamily="18" charset="0"/>
-                            </a:rPr>
-                            <m:t>𝑠</m:t>
-                          </m:r>
-                        </m:e>
-                      </m:d>
-                      <m:r>
-                        <a:rPr lang="fr-FR" i="0">
-                          <a:latin typeface="Cambria Math" panose="02040503050406030204" pitchFamily="18" charset="0"/>
-                        </a:rPr>
-                        <m:t>=</m:t>
-                      </m:r>
-                      <m:sSubSup>
-                        <m:sSubSupPr>
-                          <m:ctrlPr>
-                            <a:rPr lang="fr-FR" i="1">
-                              <a:latin typeface="Cambria Math" panose="02040503050406030204" pitchFamily="18" charset="0"/>
-                            </a:rPr>
-                          </m:ctrlPr>
-                        </m:sSubSupPr>
-                        <m:e>
-                          <m:r>
-                            <m:rPr>
-                              <m:sty m:val="p"/>
-                            </m:rPr>
-                            <a:rPr lang="fr-FR" i="0">
-                              <a:latin typeface="Cambria Math" panose="02040503050406030204" pitchFamily="18" charset="0"/>
-                            </a:rPr>
-                            <m:t>Λ</m:t>
-                          </m:r>
-                        </m:e>
-                        <m:sub>
-                          <m:r>
-                            <a:rPr lang="fr-FR" i="1">
-                              <a:latin typeface="Cambria Math" panose="02040503050406030204" pitchFamily="18" charset="0"/>
-                            </a:rPr>
-                            <m:t>𝑖</m:t>
-                          </m:r>
-                        </m:sub>
-                        <m:sup>
-                          <m:r>
-                            <a:rPr lang="fr-FR" i="1">
-                              <a:latin typeface="Cambria Math" panose="02040503050406030204" pitchFamily="18" charset="0"/>
-                            </a:rPr>
-                            <m:t>𝐸</m:t>
-                          </m:r>
-                        </m:sup>
-                      </m:sSubSup>
-                      <m:d>
-                        <m:dPr>
-                          <m:ctrlPr>
-                            <a:rPr lang="fr-FR" i="1">
-                              <a:latin typeface="Cambria Math" panose="02040503050406030204" pitchFamily="18" charset="0"/>
-                            </a:rPr>
-                          </m:ctrlPr>
-                        </m:dPr>
-                        <m:e>
-                          <m:r>
-                            <a:rPr lang="fr-FR" i="1">
-                              <a:latin typeface="Cambria Math" panose="02040503050406030204" pitchFamily="18" charset="0"/>
-                            </a:rPr>
-                            <m:t>𝑠</m:t>
-                          </m:r>
-                        </m:e>
-                      </m:d>
-                      <m:r>
-                        <a:rPr lang="fr-FR" i="0">
-                          <a:latin typeface="Cambria Math" panose="02040503050406030204" pitchFamily="18" charset="0"/>
-                        </a:rPr>
-                        <m:t>×</m:t>
-                      </m:r>
-                      <m:sSubSup>
-                        <m:sSubSupPr>
-                          <m:ctrlPr>
-                            <a:rPr lang="fr-FR" i="1">
-                              <a:latin typeface="Cambria Math" panose="02040503050406030204" pitchFamily="18" charset="0"/>
-                            </a:rPr>
-                          </m:ctrlPr>
-                        </m:sSubSupPr>
-                        <m:e>
-                          <m:r>
-                            <m:rPr>
-                              <m:sty m:val="p"/>
-                            </m:rPr>
-                            <a:rPr lang="fr-FR" i="0">
-                              <a:latin typeface="Cambria Math" panose="02040503050406030204" pitchFamily="18" charset="0"/>
-                            </a:rPr>
-                            <m:t>Λ</m:t>
-                          </m:r>
-                        </m:e>
-                        <m:sub>
-                          <m:r>
-                            <a:rPr lang="fr-FR" i="1">
-                              <a:latin typeface="Cambria Math" panose="02040503050406030204" pitchFamily="18" charset="0"/>
-                            </a:rPr>
-                            <m:t>𝑖</m:t>
-                          </m:r>
-                        </m:sub>
-                        <m:sup>
-                          <m:r>
-                            <a:rPr lang="fr-FR" i="1">
-                              <a:latin typeface="Cambria Math" panose="02040503050406030204" pitchFamily="18" charset="0"/>
-                            </a:rPr>
-                            <m:t>𝐷</m:t>
-                          </m:r>
-                        </m:sup>
-                      </m:sSubSup>
-                      <m:d>
-                        <m:dPr>
-                          <m:ctrlPr>
-                            <a:rPr lang="fr-FR" i="1">
-                              <a:latin typeface="Cambria Math" panose="02040503050406030204" pitchFamily="18" charset="0"/>
-                            </a:rPr>
-                          </m:ctrlPr>
-                        </m:dPr>
-                        <m:e>
-                          <m:r>
-                            <a:rPr lang="fr-FR" i="1">
-                              <a:latin typeface="Cambria Math" panose="02040503050406030204" pitchFamily="18" charset="0"/>
-                            </a:rPr>
-                            <m:t>𝑠</m:t>
-                          </m:r>
-                        </m:e>
-                      </m:d>
-                    </m:oMath>
-                  </m:oMathPara>
-                </a14:m>
-                <a:endParaRPr lang="fr-FR" dirty="0"/>
-              </a:p>
-            </p:txBody>
-          </p:sp>
-        </mc:Choice>
-        <mc:Fallback>
-          <p:sp>
-            <p:nvSpPr>
-              <p:cNvPr id="5" name="ZoneTexte 4">
-                <a:extLst>
-                  <a:ext uri="{FF2B5EF4-FFF2-40B4-BE49-F238E27FC236}">
-                    <a16:creationId xmlns:a16="http://schemas.microsoft.com/office/drawing/2014/main" id="{8A10CA1A-8BD0-3151-3D8C-E231B70E004B}"/>
-                  </a:ext>
-                </a:extLst>
-              </p:cNvPr>
-              <p:cNvSpPr txBox="1">
-                <a:spLocks noRot="1" noChangeAspect="1" noMove="1" noResize="1" noEditPoints="1" noAdjustHandles="1" noChangeArrowheads="1" noChangeShapeType="1" noTextEdit="1"/>
-              </p:cNvSpPr>
-              <p:nvPr/>
-            </p:nvSpPr>
-            <p:spPr>
-              <a:xfrm>
-                <a:off x="2171700" y="4290868"/>
-                <a:ext cx="2857500" cy="384464"/>
-              </a:xfrm>
-              <a:prstGeom prst="rect">
-                <a:avLst/>
-              </a:prstGeom>
-              <a:blipFill>
-                <a:blip r:embed="rId2"/>
-                <a:stretch>
-                  <a:fillRect b="-1587"/>
-                </a:stretch>
-              </a:blipFill>
-            </p:spPr>
-            <p:txBody>
-              <a:bodyPr/>
-              <a:lstStyle/>
-              <a:p>
-                <a:r>
-                  <a:rPr lang="fr-FR">
-                    <a:noFill/>
-                  </a:rPr>
-                  <a:t> </a:t>
-                </a:r>
-              </a:p>
-            </p:txBody>
-          </p:sp>
-        </mc:Fallback>
-      </mc:AlternateContent>
-      <mc:AlternateContent xmlns:mc="http://schemas.openxmlformats.org/markup-compatibility/2006">
-        <mc:Choice xmlns:a14="http://schemas.microsoft.com/office/drawing/2010/main" Requires="a14">
-          <p:sp>
-            <p:nvSpPr>
-              <p:cNvPr id="7" name="ZoneTexte 6">
-                <a:extLst>
-                  <a:ext uri="{FF2B5EF4-FFF2-40B4-BE49-F238E27FC236}">
-                    <a16:creationId xmlns:a16="http://schemas.microsoft.com/office/drawing/2014/main" id="{79AD8DED-4E25-D0DE-53C9-DCC01A690A3B}"/>
-                  </a:ext>
-                </a:extLst>
-              </p:cNvPr>
-              <p:cNvSpPr txBox="1"/>
-              <p:nvPr/>
-            </p:nvSpPr>
-            <p:spPr>
-              <a:xfrm>
-                <a:off x="2330452" y="6183169"/>
-                <a:ext cx="1384300" cy="439031"/>
-              </a:xfrm>
-              <a:prstGeom prst="rect">
-                <a:avLst/>
-              </a:prstGeom>
-              <a:noFill/>
-            </p:spPr>
-            <p:txBody>
-              <a:bodyPr wrap="square">
-                <a:spAutoFit/>
-              </a:bodyPr>
-              <a:lstStyle/>
-              <a:p>
-                <a:pPr/>
-                <a14:m>
-                  <m:oMathPara xmlns:m="http://schemas.openxmlformats.org/officeDocument/2006/math">
-                    <m:oMathParaPr>
-                      <m:jc m:val="centerGroup"/>
-                    </m:oMathParaPr>
-                    <m:oMath xmlns:m="http://schemas.openxmlformats.org/officeDocument/2006/math">
-                      <m:sSubSup>
-                        <m:sSubSupPr>
-                          <m:ctrlPr>
-                            <a:rPr lang="fr-FR" i="1" smtClean="0">
-                              <a:latin typeface="Cambria Math" panose="02040503050406030204" pitchFamily="18" charset="0"/>
-                            </a:rPr>
-                          </m:ctrlPr>
-                        </m:sSubSupPr>
-                        <m:e>
-                          <m:r>
-                            <a:rPr lang="fr-FR" i="1">
+                            <a:rPr lang="fr-FR" sz="1400" i="1">
                               <a:latin typeface="Cambria Math" panose="02040503050406030204" pitchFamily="18" charset="0"/>
                             </a:rPr>
                             <m:t>𝑌</m:t>
@@ -10384,7 +10465,7 @@
                         </m:e>
                         <m:sub>
                           <m:r>
-                            <a:rPr lang="fr-FR" i="1">
+                            <a:rPr lang="fr-FR" sz="1400" i="1">
                               <a:latin typeface="Cambria Math" panose="02040503050406030204" pitchFamily="18" charset="0"/>
                             </a:rPr>
                             <m:t>𝑖</m:t>
@@ -10395,7 +10476,7 @@
                             <m:rPr>
                               <m:nor/>
                             </m:rPr>
-                            <a:rPr lang="fr-FR" b="0" i="1">
+                            <a:rPr lang="fr-FR" sz="1400" b="0" i="1">
                               <a:latin typeface="Cambria Math" panose="02040503050406030204" pitchFamily="18" charset="0"/>
                             </a:rPr>
                             <m:t>rk</m:t>
@@ -10405,14 +10486,14 @@
                       <m:d>
                         <m:dPr>
                           <m:ctrlPr>
-                            <a:rPr lang="fr-FR" b="0" i="1">
+                            <a:rPr lang="fr-FR" sz="1400" b="0" i="1">
                               <a:latin typeface="Cambria Math" panose="02040503050406030204" pitchFamily="18" charset="0"/>
                             </a:rPr>
                           </m:ctrlPr>
                         </m:dPr>
                         <m:e>
                           <m:r>
-                            <a:rPr lang="fr-FR" b="0" i="1">
+                            <a:rPr lang="fr-FR" sz="1400" b="0" i="1">
                               <a:latin typeface="Cambria Math" panose="02040503050406030204" pitchFamily="18" charset="0"/>
                             </a:rPr>
                             <m:t>𝑠</m:t>
@@ -10422,7 +10503,7 @@
                     </m:oMath>
                   </m:oMathPara>
                 </a14:m>
-                <a:endParaRPr lang="fr-FR" dirty="0"/>
+                <a:endParaRPr lang="fr-FR" sz="1400" dirty="0"/>
               </a:p>
             </p:txBody>
           </p:sp>
@@ -10444,8 +10525,8 @@
             </p:nvSpPr>
             <p:spPr>
               <a:xfrm>
-                <a:off x="2330452" y="6183169"/>
-                <a:ext cx="1384300" cy="439031"/>
+                <a:off x="2928993" y="5038876"/>
+                <a:ext cx="1384300" cy="361959"/>
               </a:xfrm>
               <a:prstGeom prst="rect">
                 <a:avLst/>
@@ -10453,7 +10534,7 @@
               <a:blipFill>
                 <a:blip r:embed="rId3"/>
                 <a:stretch>
-                  <a:fillRect b="-1389"/>
+                  <a:fillRect/>
                 </a:stretch>
               </a:blipFill>
             </p:spPr>
@@ -10488,8 +10569,8 @@
             </p:nvSpPr>
             <p:spPr>
               <a:xfrm>
-                <a:off x="4165600" y="6183169"/>
-                <a:ext cx="1384300" cy="440185"/>
+                <a:off x="4230304" y="5050417"/>
+                <a:ext cx="1384300" cy="362856"/>
               </a:xfrm>
               <a:prstGeom prst="rect">
                 <a:avLst/>
@@ -10512,14 +10593,14 @@
                       <m:sSubSup>
                         <m:sSubSupPr>
                           <m:ctrlPr>
-                            <a:rPr lang="fr-FR" i="1" smtClean="0">
+                            <a:rPr lang="fr-FR" sz="1400" i="1" smtClean="0">
                               <a:latin typeface="Cambria Math" panose="02040503050406030204" pitchFamily="18" charset="0"/>
                             </a:rPr>
                           </m:ctrlPr>
                         </m:sSubSupPr>
                         <m:e>
                           <m:r>
-                            <a:rPr lang="fr-FR" i="1">
+                            <a:rPr lang="fr-FR" sz="1400" i="1">
                               <a:latin typeface="Cambria Math" panose="02040503050406030204" pitchFamily="18" charset="0"/>
                             </a:rPr>
                             <m:t>𝑌</m:t>
@@ -10527,7 +10608,7 @@
                         </m:e>
                         <m:sub>
                           <m:r>
-                            <a:rPr lang="fr-FR" i="1">
+                            <a:rPr lang="fr-FR" sz="1400" i="1">
                               <a:latin typeface="Cambria Math" panose="02040503050406030204" pitchFamily="18" charset="0"/>
                             </a:rPr>
                             <m:t>𝑖</m:t>
@@ -10538,7 +10619,7 @@
                             <m:rPr>
                               <m:nor/>
                             </m:rPr>
-                            <a:rPr lang="fr-FR" b="0" i="1">
+                            <a:rPr lang="fr-FR" sz="1400" b="0" i="1">
                               <a:latin typeface="Cambria Math" panose="02040503050406030204" pitchFamily="18" charset="0"/>
                             </a:rPr>
                             <m:t>lv</m:t>
@@ -10548,14 +10629,14 @@
                       <m:d>
                         <m:dPr>
                           <m:ctrlPr>
-                            <a:rPr lang="fr-FR" b="0" i="1">
+                            <a:rPr lang="fr-FR" sz="1400" b="0" i="1">
                               <a:latin typeface="Cambria Math" panose="02040503050406030204" pitchFamily="18" charset="0"/>
                             </a:rPr>
                           </m:ctrlPr>
                         </m:dPr>
                         <m:e>
                           <m:r>
-                            <a:rPr lang="fr-FR" b="0" i="1">
+                            <a:rPr lang="fr-FR" sz="1400" b="0" i="1">
                               <a:latin typeface="Cambria Math" panose="02040503050406030204" pitchFamily="18" charset="0"/>
                             </a:rPr>
                             <m:t>𝑠</m:t>
@@ -10565,7 +10646,7 @@
                     </m:oMath>
                   </m:oMathPara>
                 </a14:m>
-                <a:endParaRPr lang="fr-FR" dirty="0"/>
+                <a:endParaRPr lang="fr-FR" sz="1400" dirty="0"/>
               </a:p>
             </p:txBody>
           </p:sp>
@@ -10587,8 +10668,8 @@
             </p:nvSpPr>
             <p:spPr>
               <a:xfrm>
-                <a:off x="4165600" y="6183169"/>
-                <a:ext cx="1384300" cy="440185"/>
+                <a:off x="4230304" y="5050417"/>
+                <a:ext cx="1384300" cy="362856"/>
               </a:xfrm>
               <a:prstGeom prst="rect">
                 <a:avLst/>
@@ -10631,8 +10712,770 @@
             </p:nvSpPr>
             <p:spPr>
               <a:xfrm>
-                <a:off x="5029200" y="4841871"/>
-                <a:ext cx="1117600" cy="440185"/>
+                <a:off x="6334125" y="5025365"/>
+                <a:ext cx="1117600" cy="362856"/>
+              </a:xfrm>
+              <a:prstGeom prst="rect">
+                <a:avLst/>
+              </a:prstGeom>
+              <a:noFill/>
+            </p:spPr>
+            <p:txBody>
+              <a:bodyPr wrap="square">
+                <a:spAutoFit/>
+              </a:bodyPr>
+              <a:lstStyle/>
+              <a:p>
+                <a:pPr/>
+                <a14:m>
+                  <m:oMathPara xmlns:m="http://schemas.openxmlformats.org/officeDocument/2006/math">
+                    <m:oMathParaPr>
+                      <m:jc m:val="left"/>
+                    </m:oMathParaPr>
+                    <m:oMath xmlns:m="http://schemas.openxmlformats.org/officeDocument/2006/math">
+                      <m:sSubSup>
+                        <m:sSubSupPr>
+                          <m:ctrlPr>
+                            <a:rPr lang="fr-FR" sz="1400" i="1" smtClean="0">
+                              <a:latin typeface="Cambria Math" panose="02040503050406030204" pitchFamily="18" charset="0"/>
+                            </a:rPr>
+                          </m:ctrlPr>
+                        </m:sSubSupPr>
+                        <m:e>
+                          <m:r>
+                            <m:rPr>
+                              <m:sty m:val="p"/>
+                            </m:rPr>
+                            <a:rPr lang="fr-FR" sz="1400">
+                              <a:latin typeface="Cambria Math" panose="02040503050406030204" pitchFamily="18" charset="0"/>
+                            </a:rPr>
+                            <m:t>Λ</m:t>
+                          </m:r>
+                        </m:e>
+                        <m:sub>
+                          <m:r>
+                            <a:rPr lang="fr-FR" sz="1400" i="1">
+                              <a:latin typeface="Cambria Math" panose="02040503050406030204" pitchFamily="18" charset="0"/>
+                            </a:rPr>
+                            <m:t>𝑖</m:t>
+                          </m:r>
+                        </m:sub>
+                        <m:sup>
+                          <m:r>
+                            <m:rPr>
+                              <m:nor/>
+                            </m:rPr>
+                            <a:rPr lang="fr-FR" sz="1400" b="0" i="1">
+                              <a:latin typeface="Cambria Math" panose="02040503050406030204" pitchFamily="18" charset="0"/>
+                            </a:rPr>
+                            <m:t>lv</m:t>
+                          </m:r>
+                        </m:sup>
+                      </m:sSubSup>
+                      <m:d>
+                        <m:dPr>
+                          <m:ctrlPr>
+                            <a:rPr lang="fr-FR" sz="1400" b="0" i="1">
+                              <a:latin typeface="Cambria Math" panose="02040503050406030204" pitchFamily="18" charset="0"/>
+                            </a:rPr>
+                          </m:ctrlPr>
+                        </m:dPr>
+                        <m:e>
+                          <m:r>
+                            <a:rPr lang="fr-FR" sz="1400" b="0" i="1">
+                              <a:latin typeface="Cambria Math" panose="02040503050406030204" pitchFamily="18" charset="0"/>
+                            </a:rPr>
+                            <m:t>𝑠</m:t>
+                          </m:r>
+                        </m:e>
+                      </m:d>
+                    </m:oMath>
+                  </m:oMathPara>
+                </a14:m>
+                <a:endParaRPr lang="fr-FR" sz="1400" dirty="0"/>
+              </a:p>
+            </p:txBody>
+          </p:sp>
+        </mc:Choice>
+        <mc:Fallback>
+          <p:sp>
+            <p:nvSpPr>
+              <p:cNvPr id="13" name="ZoneTexte 12">
+                <a:extLst>
+                  <a:ext uri="{FF2B5EF4-FFF2-40B4-BE49-F238E27FC236}">
+                    <a16:creationId xmlns:a16="http://schemas.microsoft.com/office/drawing/2014/main" id="{F4F497C3-B171-BB7D-D4FE-DCABFC91E315}"/>
+                  </a:ext>
+                </a:extLst>
+              </p:cNvPr>
+              <p:cNvSpPr txBox="1">
+                <a:spLocks noRot="1" noChangeAspect="1" noMove="1" noResize="1" noEditPoints="1" noAdjustHandles="1" noChangeArrowheads="1" noChangeShapeType="1" noTextEdit="1"/>
+              </p:cNvSpPr>
+              <p:nvPr/>
+            </p:nvSpPr>
+            <p:spPr>
+              <a:xfrm>
+                <a:off x="6334125" y="5025365"/>
+                <a:ext cx="1117600" cy="362856"/>
+              </a:xfrm>
+              <a:prstGeom prst="rect">
+                <a:avLst/>
+              </a:prstGeom>
+              <a:blipFill>
+                <a:blip r:embed="rId5"/>
+                <a:stretch>
+                  <a:fillRect/>
+                </a:stretch>
+              </a:blipFill>
+            </p:spPr>
+            <p:txBody>
+              <a:bodyPr/>
+              <a:lstStyle/>
+              <a:p>
+                <a:r>
+                  <a:rPr lang="fr-FR">
+                    <a:noFill/>
+                  </a:rPr>
+                  <a:t> </a:t>
+                </a:r>
+              </a:p>
+            </p:txBody>
+          </p:sp>
+        </mc:Fallback>
+      </mc:AlternateContent>
+      <p:cxnSp>
+        <p:nvCxnSpPr>
+          <p:cNvPr id="19" name="Connecteur droit avec flèche 18">
+            <a:extLst>
+              <a:ext uri="{FF2B5EF4-FFF2-40B4-BE49-F238E27FC236}">
+                <a16:creationId xmlns:a16="http://schemas.microsoft.com/office/drawing/2014/main" id="{8024077A-B712-2E3B-E127-A93617CB6C23}"/>
+              </a:ext>
+            </a:extLst>
+          </p:cNvPr>
+          <p:cNvCxnSpPr>
+            <a:cxnSpLocks/>
+            <a:stCxn id="137" idx="3"/>
+          </p:cNvCxnSpPr>
+          <p:nvPr/>
+        </p:nvCxnSpPr>
+        <p:spPr>
+          <a:xfrm flipH="1">
+            <a:off x="3420288" y="3771860"/>
+            <a:ext cx="383896" cy="1295194"/>
+          </a:xfrm>
+          <a:prstGeom prst="straightConnector1">
+            <a:avLst/>
+          </a:prstGeom>
+          <a:ln w="9525">
+            <a:solidFill>
+              <a:schemeClr val="tx1"/>
+            </a:solidFill>
+            <a:tailEnd type="triangle"/>
+          </a:ln>
+        </p:spPr>
+        <p:style>
+          <a:lnRef idx="2">
+            <a:schemeClr val="accent1"/>
+          </a:lnRef>
+          <a:fillRef idx="0">
+            <a:schemeClr val="accent1"/>
+          </a:fillRef>
+          <a:effectRef idx="1">
+            <a:schemeClr val="accent1"/>
+          </a:effectRef>
+          <a:fontRef idx="minor">
+            <a:schemeClr val="tx1"/>
+          </a:fontRef>
+        </p:style>
+      </p:cxnSp>
+      <p:cxnSp>
+        <p:nvCxnSpPr>
+          <p:cNvPr id="22" name="Connecteur droit avec flèche 21">
+            <a:extLst>
+              <a:ext uri="{FF2B5EF4-FFF2-40B4-BE49-F238E27FC236}">
+                <a16:creationId xmlns:a16="http://schemas.microsoft.com/office/drawing/2014/main" id="{DB33F015-D8E7-6DB8-6B8B-E8252FDCF861}"/>
+              </a:ext>
+            </a:extLst>
+          </p:cNvPr>
+          <p:cNvCxnSpPr>
+            <a:cxnSpLocks/>
+          </p:cNvCxnSpPr>
+          <p:nvPr/>
+        </p:nvCxnSpPr>
+        <p:spPr>
+          <a:xfrm>
+            <a:off x="5447493" y="3877053"/>
+            <a:ext cx="886632" cy="1097756"/>
+          </a:xfrm>
+          <a:prstGeom prst="straightConnector1">
+            <a:avLst/>
+          </a:prstGeom>
+          <a:ln w="9525">
+            <a:solidFill>
+              <a:schemeClr val="tx1"/>
+            </a:solidFill>
+            <a:tailEnd type="triangle"/>
+          </a:ln>
+        </p:spPr>
+        <p:style>
+          <a:lnRef idx="2">
+            <a:schemeClr val="accent1"/>
+          </a:lnRef>
+          <a:fillRef idx="0">
+            <a:schemeClr val="accent1"/>
+          </a:fillRef>
+          <a:effectRef idx="1">
+            <a:schemeClr val="accent1"/>
+          </a:effectRef>
+          <a:fontRef idx="minor">
+            <a:schemeClr val="tx1"/>
+          </a:fontRef>
+        </p:style>
+      </p:cxnSp>
+      <p:cxnSp>
+        <p:nvCxnSpPr>
+          <p:cNvPr id="27" name="Connecteur droit avec flèche 26">
+            <a:extLst>
+              <a:ext uri="{FF2B5EF4-FFF2-40B4-BE49-F238E27FC236}">
+                <a16:creationId xmlns:a16="http://schemas.microsoft.com/office/drawing/2014/main" id="{C8754EA8-5992-E327-26D3-1C9760C4C102}"/>
+              </a:ext>
+            </a:extLst>
+          </p:cNvPr>
+          <p:cNvCxnSpPr>
+            <a:cxnSpLocks/>
+          </p:cNvCxnSpPr>
+          <p:nvPr/>
+        </p:nvCxnSpPr>
+        <p:spPr>
+          <a:xfrm flipH="1">
+            <a:off x="7176333" y="5224788"/>
+            <a:ext cx="510342" cy="0"/>
+          </a:xfrm>
+          <a:prstGeom prst="straightConnector1">
+            <a:avLst/>
+          </a:prstGeom>
+          <a:ln w="9525">
+            <a:solidFill>
+              <a:schemeClr val="tx1"/>
+            </a:solidFill>
+            <a:tailEnd type="triangle"/>
+          </a:ln>
+        </p:spPr>
+        <p:style>
+          <a:lnRef idx="2">
+            <a:schemeClr val="accent1"/>
+          </a:lnRef>
+          <a:fillRef idx="0">
+            <a:schemeClr val="accent1"/>
+          </a:fillRef>
+          <a:effectRef idx="1">
+            <a:schemeClr val="accent1"/>
+          </a:effectRef>
+          <a:fontRef idx="minor">
+            <a:schemeClr val="tx1"/>
+          </a:fontRef>
+        </p:style>
+      </p:cxnSp>
+      <p:cxnSp>
+        <p:nvCxnSpPr>
+          <p:cNvPr id="33" name="Connecteur droit avec flèche 32">
+            <a:extLst>
+              <a:ext uri="{FF2B5EF4-FFF2-40B4-BE49-F238E27FC236}">
+                <a16:creationId xmlns:a16="http://schemas.microsoft.com/office/drawing/2014/main" id="{5D75F9C1-C1B6-E056-CE1D-53A859332BC2}"/>
+              </a:ext>
+            </a:extLst>
+          </p:cNvPr>
+          <p:cNvCxnSpPr>
+            <a:cxnSpLocks/>
+            <a:stCxn id="123" idx="6"/>
+          </p:cNvCxnSpPr>
+          <p:nvPr/>
+        </p:nvCxnSpPr>
+        <p:spPr>
+          <a:xfrm>
+            <a:off x="2545151" y="3328428"/>
+            <a:ext cx="876317" cy="0"/>
+          </a:xfrm>
+          <a:prstGeom prst="straightConnector1">
+            <a:avLst/>
+          </a:prstGeom>
+          <a:ln w="9525">
+            <a:solidFill>
+              <a:schemeClr val="tx1"/>
+            </a:solidFill>
+            <a:tailEnd type="triangle"/>
+          </a:ln>
+        </p:spPr>
+        <p:style>
+          <a:lnRef idx="2">
+            <a:schemeClr val="accent1"/>
+          </a:lnRef>
+          <a:fillRef idx="0">
+            <a:schemeClr val="accent1"/>
+          </a:fillRef>
+          <a:effectRef idx="1">
+            <a:schemeClr val="accent1"/>
+          </a:effectRef>
+          <a:fontRef idx="minor">
+            <a:schemeClr val="tx1"/>
+          </a:fontRef>
+        </p:style>
+      </p:cxnSp>
+      <p:grpSp>
+        <p:nvGrpSpPr>
+          <p:cNvPr id="136" name="Groupe 135">
+            <a:extLst>
+              <a:ext uri="{FF2B5EF4-FFF2-40B4-BE49-F238E27FC236}">
+                <a16:creationId xmlns:a16="http://schemas.microsoft.com/office/drawing/2014/main" id="{303D1512-FB86-199F-1FBB-AF8E2E544E5A}"/>
+              </a:ext>
+            </a:extLst>
+          </p:cNvPr>
+          <p:cNvGrpSpPr/>
+          <p:nvPr/>
+        </p:nvGrpSpPr>
+        <p:grpSpPr>
+          <a:xfrm>
+            <a:off x="-164536" y="2712406"/>
+            <a:ext cx="2709687" cy="1232043"/>
+            <a:chOff x="-461588" y="2757367"/>
+            <a:chExt cx="2709687" cy="1232043"/>
+          </a:xfrm>
+        </p:grpSpPr>
+        <p:sp>
+          <p:nvSpPr>
+            <p:cNvPr id="123" name="Ellipse 122">
+              <a:extLst>
+                <a:ext uri="{FF2B5EF4-FFF2-40B4-BE49-F238E27FC236}">
+                  <a16:creationId xmlns:a16="http://schemas.microsoft.com/office/drawing/2014/main" id="{D6EF958C-6E03-AC1D-25E2-F225401C0484}"/>
+                </a:ext>
+              </a:extLst>
+            </p:cNvPr>
+            <p:cNvSpPr/>
+            <p:nvPr/>
+          </p:nvSpPr>
+          <p:spPr>
+            <a:xfrm>
+              <a:off x="-438345" y="2757367"/>
+              <a:ext cx="2686444" cy="1232043"/>
+            </a:xfrm>
+            <a:prstGeom prst="ellipse">
+              <a:avLst/>
+            </a:prstGeom>
+            <a:solidFill>
+              <a:srgbClr val="E2DFE3"/>
+            </a:solidFill>
+          </p:spPr>
+          <p:style>
+            <a:lnRef idx="2">
+              <a:schemeClr val="accent1">
+                <a:shade val="15000"/>
+              </a:schemeClr>
+            </a:lnRef>
+            <a:fillRef idx="1">
+              <a:schemeClr val="accent1"/>
+            </a:fillRef>
+            <a:effectRef idx="0">
+              <a:schemeClr val="accent1"/>
+            </a:effectRef>
+            <a:fontRef idx="minor">
+              <a:schemeClr val="lt1"/>
+            </a:fontRef>
+          </p:style>
+          <p:txBody>
+            <a:bodyPr rtlCol="0" anchor="t"/>
+            <a:lstStyle/>
+            <a:p>
+              <a:pPr algn="ctr"/>
+              <a:r>
+                <a:rPr lang="fr-FR" b="1" dirty="0">
+                  <a:solidFill>
+                    <a:schemeClr val="tx1"/>
+                  </a:solidFill>
+                </a:rPr>
+                <a:t>Danger model</a:t>
+              </a:r>
+            </a:p>
+          </p:txBody>
+        </p:sp>
+        <mc:AlternateContent xmlns:mc="http://schemas.openxmlformats.org/markup-compatibility/2006">
+          <mc:Choice xmlns:a14="http://schemas.microsoft.com/office/drawing/2010/main" Requires="a14">
+            <p:sp>
+              <p:nvSpPr>
+                <p:cNvPr id="39" name="ZoneTexte 38">
+                  <a:extLst>
+                    <a:ext uri="{FF2B5EF4-FFF2-40B4-BE49-F238E27FC236}">
+                      <a16:creationId xmlns:a16="http://schemas.microsoft.com/office/drawing/2014/main" id="{52D4E2EC-C2DE-0CDD-3AA9-E3F59AAA1703}"/>
+                    </a:ext>
+                  </a:extLst>
+                </p:cNvPr>
+                <p:cNvSpPr txBox="1"/>
+                <p:nvPr/>
+              </p:nvSpPr>
+              <p:spPr>
+                <a:xfrm>
+                  <a:off x="-461588" y="3197214"/>
+                  <a:ext cx="2533650" cy="697114"/>
+                </a:xfrm>
+                <a:prstGeom prst="rect">
+                  <a:avLst/>
+                </a:prstGeom>
+                <a:noFill/>
+              </p:spPr>
+              <p:txBody>
+                <a:bodyPr wrap="square">
+                  <a:spAutoFit/>
+                </a:bodyPr>
+                <a:lstStyle/>
+                <a:p>
+                  <a:pPr/>
+                  <a14:m>
+                    <m:oMathPara xmlns:m="http://schemas.openxmlformats.org/officeDocument/2006/math">
+                      <m:oMathParaPr>
+                        <m:jc m:val="centerGroup"/>
+                      </m:oMathParaPr>
+                      <m:oMath xmlns:m="http://schemas.openxmlformats.org/officeDocument/2006/math">
+                        <m:sSub>
+                          <m:sSubPr>
+                            <m:ctrlPr>
+                              <a:rPr lang="fr-FR" sz="1400" i="1" smtClean="0">
+                                <a:latin typeface="Cambria Math" panose="02040503050406030204" pitchFamily="18" charset="0"/>
+                              </a:rPr>
+                            </m:ctrlPr>
+                          </m:sSubPr>
+                          <m:e>
+                            <m:r>
+                              <a:rPr lang="fr-FR" sz="1400" i="1">
+                                <a:latin typeface="Cambria Math" panose="02040503050406030204" pitchFamily="18" charset="0"/>
+                              </a:rPr>
+                              <m:t>𝛼</m:t>
+                            </m:r>
+                          </m:e>
+                          <m:sub>
+                            <m:r>
+                              <a:rPr lang="fr-FR" sz="1400" i="0">
+                                <a:latin typeface="Cambria Math" panose="02040503050406030204" pitchFamily="18" charset="0"/>
+                              </a:rPr>
+                              <m:t>0</m:t>
+                            </m:r>
+                          </m:sub>
+                        </m:sSub>
+                        <m:r>
+                          <a:rPr lang="fr-FR" sz="1400" i="0">
+                            <a:latin typeface="Cambria Math" panose="02040503050406030204" pitchFamily="18" charset="0"/>
+                          </a:rPr>
+                          <m:t>+</m:t>
+                        </m:r>
+                        <m:nary>
+                          <m:naryPr>
+                            <m:chr m:val="∑"/>
+                            <m:limLoc m:val="undOvr"/>
+                            <m:ctrlPr>
+                              <a:rPr lang="fr-FR" sz="1400" i="1">
+                                <a:latin typeface="Cambria Math" panose="02040503050406030204" pitchFamily="18" charset="0"/>
+                              </a:rPr>
+                            </m:ctrlPr>
+                          </m:naryPr>
+                          <m:sub>
+                            <m:r>
+                              <a:rPr lang="fr-FR" sz="1400" i="1">
+                                <a:latin typeface="Cambria Math" panose="02040503050406030204" pitchFamily="18" charset="0"/>
+                              </a:rPr>
+                              <m:t>𝑘</m:t>
+                            </m:r>
+                            <m:r>
+                              <a:rPr lang="fr-FR" sz="1400" i="0">
+                                <a:latin typeface="Cambria Math" panose="02040503050406030204" pitchFamily="18" charset="0"/>
+                              </a:rPr>
+                              <m:t>=1</m:t>
+                            </m:r>
+                          </m:sub>
+                          <m:sup>
+                            <m:r>
+                              <a:rPr lang="fr-FR" sz="1400" i="0">
+                                <a:latin typeface="Cambria Math" panose="02040503050406030204" pitchFamily="18" charset="0"/>
+                              </a:rPr>
+                              <m:t>4</m:t>
+                            </m:r>
+                          </m:sup>
+                          <m:e>
+                            <m:sSub>
+                              <m:sSubPr>
+                                <m:ctrlPr>
+                                  <a:rPr lang="fr-FR" sz="1400" i="1">
+                                    <a:latin typeface="Cambria Math" panose="02040503050406030204" pitchFamily="18" charset="0"/>
+                                  </a:rPr>
+                                </m:ctrlPr>
+                              </m:sSubPr>
+                              <m:e>
+                                <m:r>
+                                  <a:rPr lang="fr-FR" sz="1400" i="1">
+                                    <a:latin typeface="Cambria Math" panose="02040503050406030204" pitchFamily="18" charset="0"/>
+                                  </a:rPr>
+                                  <m:t>𝛼</m:t>
+                                </m:r>
+                              </m:e>
+                              <m:sub>
+                                <m:r>
+                                  <a:rPr lang="fr-FR" sz="1400" i="1">
+                                    <a:latin typeface="Cambria Math" panose="02040503050406030204" pitchFamily="18" charset="0"/>
+                                  </a:rPr>
+                                  <m:t>𝑘</m:t>
+                                </m:r>
+                              </m:sub>
+                            </m:sSub>
+                            <m:sSub>
+                              <m:sSubPr>
+                                <m:ctrlPr>
+                                  <a:rPr lang="fr-FR" sz="1400" i="1">
+                                    <a:latin typeface="Cambria Math" panose="02040503050406030204" pitchFamily="18" charset="0"/>
+                                  </a:rPr>
+                                </m:ctrlPr>
+                              </m:sSubPr>
+                              <m:e>
+                                <m:r>
+                                  <m:rPr>
+                                    <m:nor/>
+                                  </m:rPr>
+                                  <a:rPr lang="fr-FR" sz="1400" b="0" i="1">
+                                    <a:latin typeface="Cambria Math" panose="02040503050406030204" pitchFamily="18" charset="0"/>
+                                  </a:rPr>
+                                  <m:t>PC</m:t>
+                                </m:r>
+                              </m:e>
+                              <m:sub>
+                                <m:r>
+                                  <a:rPr lang="fr-FR" sz="1400" b="0" i="1">
+                                    <a:latin typeface="Cambria Math" panose="02040503050406030204" pitchFamily="18" charset="0"/>
+                                  </a:rPr>
+                                  <m:t>𝑘</m:t>
+                                </m:r>
+                              </m:sub>
+                            </m:sSub>
+                            <m:d>
+                              <m:dPr>
+                                <m:ctrlPr>
+                                  <a:rPr lang="fr-FR" sz="1400" b="0" i="1">
+                                    <a:latin typeface="Cambria Math" panose="02040503050406030204" pitchFamily="18" charset="0"/>
+                                  </a:rPr>
+                                </m:ctrlPr>
+                              </m:dPr>
+                              <m:e>
+                                <m:r>
+                                  <a:rPr lang="fr-FR" sz="1400" b="0" i="1">
+                                    <a:latin typeface="Cambria Math" panose="02040503050406030204" pitchFamily="18" charset="0"/>
+                                  </a:rPr>
+                                  <m:t>𝑠</m:t>
+                                </m:r>
+                              </m:e>
+                            </m:d>
+                          </m:e>
+                        </m:nary>
+                      </m:oMath>
+                    </m:oMathPara>
+                  </a14:m>
+                  <a:endParaRPr lang="fr-FR" sz="1400" dirty="0"/>
+                </a:p>
+              </p:txBody>
+            </p:sp>
+          </mc:Choice>
+          <mc:Fallback>
+            <p:sp>
+              <p:nvSpPr>
+                <p:cNvPr id="39" name="ZoneTexte 38">
+                  <a:extLst>
+                    <a:ext uri="{FF2B5EF4-FFF2-40B4-BE49-F238E27FC236}">
+                      <a16:creationId xmlns:a16="http://schemas.microsoft.com/office/drawing/2014/main" id="{52D4E2EC-C2DE-0CDD-3AA9-E3F59AAA1703}"/>
+                    </a:ext>
+                  </a:extLst>
+                </p:cNvPr>
+                <p:cNvSpPr txBox="1">
+                  <a:spLocks noRot="1" noChangeAspect="1" noMove="1" noResize="1" noEditPoints="1" noAdjustHandles="1" noChangeArrowheads="1" noChangeShapeType="1" noTextEdit="1"/>
+                </p:cNvSpPr>
+                <p:nvPr/>
+              </p:nvSpPr>
+              <p:spPr>
+                <a:xfrm>
+                  <a:off x="-461588" y="3197214"/>
+                  <a:ext cx="2533650" cy="697114"/>
+                </a:xfrm>
+                <a:prstGeom prst="rect">
+                  <a:avLst/>
+                </a:prstGeom>
+                <a:blipFill>
+                  <a:blip r:embed="rId6"/>
+                  <a:stretch>
+                    <a:fillRect/>
+                  </a:stretch>
+                </a:blipFill>
+              </p:spPr>
+              <p:txBody>
+                <a:bodyPr/>
+                <a:lstStyle/>
+                <a:p>
+                  <a:r>
+                    <a:rPr lang="fr-FR">
+                      <a:noFill/>
+                    </a:rPr>
+                    <a:t> </a:t>
+                  </a:r>
+                </a:p>
+              </p:txBody>
+            </p:sp>
+          </mc:Fallback>
+        </mc:AlternateContent>
+      </p:grpSp>
+      <p:cxnSp>
+        <p:nvCxnSpPr>
+          <p:cNvPr id="44" name="Connecteur droit avec flèche 43">
+            <a:extLst>
+              <a:ext uri="{FF2B5EF4-FFF2-40B4-BE49-F238E27FC236}">
+                <a16:creationId xmlns:a16="http://schemas.microsoft.com/office/drawing/2014/main" id="{DAE87AF2-CB0A-56E9-A8CE-E64DD4D49FAE}"/>
+              </a:ext>
+            </a:extLst>
+          </p:cNvPr>
+          <p:cNvCxnSpPr>
+            <a:cxnSpLocks/>
+            <a:stCxn id="82" idx="4"/>
+            <a:endCxn id="35" idx="0"/>
+          </p:cNvCxnSpPr>
+          <p:nvPr/>
+        </p:nvCxnSpPr>
+        <p:spPr>
+          <a:xfrm>
+            <a:off x="7959869" y="4703369"/>
+            <a:ext cx="0" cy="354847"/>
+          </a:xfrm>
+          <a:prstGeom prst="straightConnector1">
+            <a:avLst/>
+          </a:prstGeom>
+          <a:ln w="9525">
+            <a:solidFill>
+              <a:schemeClr val="tx1"/>
+            </a:solidFill>
+            <a:tailEnd type="triangle"/>
+          </a:ln>
+        </p:spPr>
+        <p:style>
+          <a:lnRef idx="2">
+            <a:schemeClr val="accent1"/>
+          </a:lnRef>
+          <a:fillRef idx="0">
+            <a:schemeClr val="accent1"/>
+          </a:fillRef>
+          <a:effectRef idx="1">
+            <a:schemeClr val="accent1"/>
+          </a:effectRef>
+          <a:fontRef idx="minor">
+            <a:schemeClr val="tx1"/>
+          </a:fontRef>
+        </p:style>
+      </p:cxnSp>
+      <p:cxnSp>
+        <p:nvCxnSpPr>
+          <p:cNvPr id="54" name="Connecteur droit avec flèche 53">
+            <a:extLst>
+              <a:ext uri="{FF2B5EF4-FFF2-40B4-BE49-F238E27FC236}">
+                <a16:creationId xmlns:a16="http://schemas.microsoft.com/office/drawing/2014/main" id="{BDFA93E3-64BD-5833-5C54-F1CE783B2C9B}"/>
+              </a:ext>
+            </a:extLst>
+          </p:cNvPr>
+          <p:cNvCxnSpPr>
+            <a:cxnSpLocks/>
+            <a:endCxn id="90" idx="6"/>
+          </p:cNvCxnSpPr>
+          <p:nvPr/>
+        </p:nvCxnSpPr>
+        <p:spPr>
+          <a:xfrm flipH="1">
+            <a:off x="5455967" y="1374438"/>
+            <a:ext cx="743760" cy="0"/>
+          </a:xfrm>
+          <a:prstGeom prst="straightConnector1">
+            <a:avLst/>
+          </a:prstGeom>
+          <a:ln w="9525">
+            <a:solidFill>
+              <a:schemeClr val="tx1"/>
+            </a:solidFill>
+            <a:tailEnd type="triangle"/>
+          </a:ln>
+        </p:spPr>
+        <p:style>
+          <a:lnRef idx="2">
+            <a:schemeClr val="accent1"/>
+          </a:lnRef>
+          <a:fillRef idx="0">
+            <a:schemeClr val="accent1"/>
+          </a:fillRef>
+          <a:effectRef idx="1">
+            <a:schemeClr val="accent1"/>
+          </a:effectRef>
+          <a:fontRef idx="minor">
+            <a:schemeClr val="tx1"/>
+          </a:fontRef>
+        </p:style>
+      </p:cxnSp>
+      <p:cxnSp>
+        <p:nvCxnSpPr>
+          <p:cNvPr id="63" name="Connecteur droit avec flèche 62">
+            <a:extLst>
+              <a:ext uri="{FF2B5EF4-FFF2-40B4-BE49-F238E27FC236}">
+                <a16:creationId xmlns:a16="http://schemas.microsoft.com/office/drawing/2014/main" id="{D6170C15-B143-25DE-B1B8-5A8AA2447481}"/>
+              </a:ext>
+            </a:extLst>
+          </p:cNvPr>
+          <p:cNvCxnSpPr>
+            <a:cxnSpLocks/>
+          </p:cNvCxnSpPr>
+          <p:nvPr/>
+        </p:nvCxnSpPr>
+        <p:spPr>
+          <a:xfrm flipH="1">
+            <a:off x="6014440" y="2598547"/>
+            <a:ext cx="920942" cy="516445"/>
+          </a:xfrm>
+          <a:prstGeom prst="straightConnector1">
+            <a:avLst/>
+          </a:prstGeom>
+          <a:ln w="9525">
+            <a:solidFill>
+              <a:schemeClr val="tx1"/>
+            </a:solidFill>
+            <a:tailEnd type="triangle"/>
+          </a:ln>
+        </p:spPr>
+        <p:style>
+          <a:lnRef idx="2">
+            <a:schemeClr val="accent1"/>
+          </a:lnRef>
+          <a:fillRef idx="0">
+            <a:schemeClr val="accent1"/>
+          </a:fillRef>
+          <a:effectRef idx="1">
+            <a:schemeClr val="accent1"/>
+          </a:effectRef>
+          <a:fontRef idx="minor">
+            <a:schemeClr val="tx1"/>
+          </a:fontRef>
+        </p:style>
+      </p:cxnSp>
+      <mc:AlternateContent xmlns:mc="http://schemas.openxmlformats.org/markup-compatibility/2006">
+        <mc:Choice xmlns:a14="http://schemas.microsoft.com/office/drawing/2010/main" Requires="a14">
+          <p:sp>
+            <p:nvSpPr>
+              <p:cNvPr id="5" name="ZoneTexte 4">
+                <a:extLst>
+                  <a:ext uri="{FF2B5EF4-FFF2-40B4-BE49-F238E27FC236}">
+                    <a16:creationId xmlns:a16="http://schemas.microsoft.com/office/drawing/2014/main" id="{8A10CA1A-8BD0-3151-3D8C-E231B70E004B}"/>
+                  </a:ext>
+                </a:extLst>
+              </p:cNvPr>
+              <p:cNvSpPr txBox="1"/>
+              <p:nvPr/>
+            </p:nvSpPr>
+            <p:spPr>
+              <a:xfrm>
+                <a:off x="3279814" y="3336267"/>
+                <a:ext cx="2857500" cy="319511"/>
               </a:xfrm>
               <a:prstGeom prst="rect">
                 <a:avLst/>
@@ -10655,7 +11498,10 @@
                       <m:sSubSup>
                         <m:sSubSupPr>
                           <m:ctrlPr>
-                            <a:rPr lang="fr-FR" i="1" smtClean="0">
+                            <a:rPr lang="fr-FR" sz="1400" i="1" smtClean="0">
+                              <a:solidFill>
+                                <a:schemeClr val="bg1"/>
+                              </a:solidFill>
                               <a:latin typeface="Cambria Math" panose="02040503050406030204" pitchFamily="18" charset="0"/>
                             </a:rPr>
                           </m:ctrlPr>
@@ -10665,7 +11511,10 @@
                             <m:rPr>
                               <m:sty m:val="p"/>
                             </m:rPr>
-                            <a:rPr lang="fr-FR">
+                            <a:rPr lang="fr-FR" sz="1400">
+                              <a:solidFill>
+                                <a:schemeClr val="bg1"/>
+                              </a:solidFill>
                               <a:latin typeface="Cambria Math" panose="02040503050406030204" pitchFamily="18" charset="0"/>
                             </a:rPr>
                             <m:t>Λ</m:t>
@@ -10673,7 +11522,10 @@
                         </m:e>
                         <m:sub>
                           <m:r>
-                            <a:rPr lang="fr-FR" i="1">
+                            <a:rPr lang="fr-FR" sz="1400" i="1">
+                              <a:solidFill>
+                                <a:schemeClr val="bg1"/>
+                              </a:solidFill>
                               <a:latin typeface="Cambria Math" panose="02040503050406030204" pitchFamily="18" charset="0"/>
                             </a:rPr>
                             <m:t>𝑖</m:t>
@@ -10681,27 +11533,193 @@
                         </m:sub>
                         <m:sup>
                           <m:r>
-                            <m:rPr>
-                              <m:nor/>
-                            </m:rPr>
-                            <a:rPr lang="fr-FR" b="0" i="1">
+                            <a:rPr lang="fr-FR" sz="1400" i="1">
+                              <a:solidFill>
+                                <a:schemeClr val="bg1"/>
+                              </a:solidFill>
                               <a:latin typeface="Cambria Math" panose="02040503050406030204" pitchFamily="18" charset="0"/>
                             </a:rPr>
-                            <m:t>lv</m:t>
+                            <m:t>𝑅</m:t>
                           </m:r>
                         </m:sup>
                       </m:sSubSup>
                       <m:d>
                         <m:dPr>
                           <m:ctrlPr>
-                            <a:rPr lang="fr-FR" b="0" i="1">
+                            <a:rPr lang="fr-FR" sz="1400" i="1">
+                              <a:solidFill>
+                                <a:schemeClr val="bg1"/>
+                              </a:solidFill>
                               <a:latin typeface="Cambria Math" panose="02040503050406030204" pitchFamily="18" charset="0"/>
                             </a:rPr>
                           </m:ctrlPr>
                         </m:dPr>
                         <m:e>
                           <m:r>
-                            <a:rPr lang="fr-FR" b="0" i="1">
+                            <a:rPr lang="fr-FR" sz="1400" i="1">
+                              <a:solidFill>
+                                <a:schemeClr val="bg1"/>
+                              </a:solidFill>
+                              <a:latin typeface="Cambria Math" panose="02040503050406030204" pitchFamily="18" charset="0"/>
+                            </a:rPr>
+                            <m:t>𝑠</m:t>
+                          </m:r>
+                        </m:e>
+                      </m:d>
+                      <m:r>
+                        <a:rPr lang="fr-FR" sz="1400" i="0">
+                          <a:solidFill>
+                            <a:schemeClr val="bg1"/>
+                          </a:solidFill>
+                          <a:latin typeface="Cambria Math" panose="02040503050406030204" pitchFamily="18" charset="0"/>
+                        </a:rPr>
+                        <m:t>=</m:t>
+                      </m:r>
+                      <m:sSubSup>
+                        <m:sSubSupPr>
+                          <m:ctrlPr>
+                            <a:rPr lang="fr-FR" sz="1400" i="1">
+                              <a:solidFill>
+                                <a:schemeClr val="bg1"/>
+                              </a:solidFill>
+                              <a:latin typeface="Cambria Math" panose="02040503050406030204" pitchFamily="18" charset="0"/>
+                            </a:rPr>
+                          </m:ctrlPr>
+                        </m:sSubSupPr>
+                        <m:e>
+                          <m:r>
+                            <m:rPr>
+                              <m:sty m:val="p"/>
+                            </m:rPr>
+                            <a:rPr lang="fr-FR" sz="1400">
+                              <a:solidFill>
+                                <a:schemeClr val="bg1"/>
+                              </a:solidFill>
+                              <a:latin typeface="Cambria Math" panose="02040503050406030204" pitchFamily="18" charset="0"/>
+                            </a:rPr>
+                            <m:t>Λ</m:t>
+                          </m:r>
+                        </m:e>
+                        <m:sub>
+                          <m:r>
+                            <a:rPr lang="fr-FR" sz="1400" i="1">
+                              <a:solidFill>
+                                <a:schemeClr val="bg1"/>
+                              </a:solidFill>
+                              <a:latin typeface="Cambria Math" panose="02040503050406030204" pitchFamily="18" charset="0"/>
+                            </a:rPr>
+                            <m:t>𝑖</m:t>
+                          </m:r>
+                        </m:sub>
+                        <m:sup>
+                          <m:r>
+                            <a:rPr lang="fr-FR" sz="1400" i="1">
+                              <a:solidFill>
+                                <a:schemeClr val="bg1"/>
+                              </a:solidFill>
+                              <a:latin typeface="Cambria Math" panose="02040503050406030204" pitchFamily="18" charset="0"/>
+                            </a:rPr>
+                            <m:t>𝐷</m:t>
+                          </m:r>
+                        </m:sup>
+                      </m:sSubSup>
+                      <m:d>
+                        <m:dPr>
+                          <m:ctrlPr>
+                            <a:rPr lang="fr-FR" sz="1400" i="1">
+                              <a:solidFill>
+                                <a:schemeClr val="bg1"/>
+                              </a:solidFill>
+                              <a:latin typeface="Cambria Math" panose="02040503050406030204" pitchFamily="18" charset="0"/>
+                            </a:rPr>
+                          </m:ctrlPr>
+                        </m:dPr>
+                        <m:e>
+                          <m:r>
+                            <a:rPr lang="fr-FR" sz="1400" i="1">
+                              <a:solidFill>
+                                <a:schemeClr val="bg1"/>
+                              </a:solidFill>
+                              <a:latin typeface="Cambria Math" panose="02040503050406030204" pitchFamily="18" charset="0"/>
+                            </a:rPr>
+                            <m:t>𝑠</m:t>
+                          </m:r>
+                        </m:e>
+                      </m:d>
+                      <m:r>
+                        <a:rPr lang="fr-FR" sz="1400">
+                          <a:solidFill>
+                            <a:schemeClr val="bg1"/>
+                          </a:solidFill>
+                          <a:latin typeface="Cambria Math" panose="02040503050406030204" pitchFamily="18" charset="0"/>
+                        </a:rPr>
+                        <m:t>×</m:t>
+                      </m:r>
+                      <m:sSubSup>
+                        <m:sSubSupPr>
+                          <m:ctrlPr>
+                            <a:rPr lang="fr-FR" sz="1400" i="1">
+                              <a:solidFill>
+                                <a:schemeClr val="bg1"/>
+                              </a:solidFill>
+                              <a:latin typeface="Cambria Math" panose="02040503050406030204" pitchFamily="18" charset="0"/>
+                            </a:rPr>
+                          </m:ctrlPr>
+                        </m:sSubSupPr>
+                        <m:e>
+                          <m:r>
+                            <m:rPr>
+                              <m:sty m:val="p"/>
+                            </m:rPr>
+                            <a:rPr lang="fr-FR" sz="1400" i="0">
+                              <a:solidFill>
+                                <a:schemeClr val="bg1"/>
+                              </a:solidFill>
+                              <a:latin typeface="Cambria Math" panose="02040503050406030204" pitchFamily="18" charset="0"/>
+                            </a:rPr>
+                            <m:t>Λ</m:t>
+                          </m:r>
+                        </m:e>
+                        <m:sub>
+                          <m:r>
+                            <a:rPr lang="fr-FR" sz="1400" i="1">
+                              <a:solidFill>
+                                <a:schemeClr val="bg1"/>
+                              </a:solidFill>
+                              <a:latin typeface="Cambria Math" panose="02040503050406030204" pitchFamily="18" charset="0"/>
+                            </a:rPr>
+                            <m:t>𝑖</m:t>
+                          </m:r>
+                        </m:sub>
+                        <m:sup>
+                          <m:r>
+                            <a:rPr lang="fr-FR" sz="1400" i="1">
+                              <a:solidFill>
+                                <a:schemeClr val="bg1"/>
+                              </a:solidFill>
+                              <a:latin typeface="Cambria Math" panose="02040503050406030204" pitchFamily="18" charset="0"/>
+                            </a:rPr>
+                            <m:t>𝐸</m:t>
+                          </m:r>
+                        </m:sup>
+                      </m:sSubSup>
+                      <m:d>
+                        <m:dPr>
+                          <m:ctrlPr>
+                            <a:rPr lang="fr-FR" sz="1400" i="1">
+                              <a:solidFill>
+                                <a:schemeClr val="bg1"/>
+                              </a:solidFill>
+                              <a:latin typeface="Cambria Math" panose="02040503050406030204" pitchFamily="18" charset="0"/>
+                            </a:rPr>
+                          </m:ctrlPr>
+                        </m:dPr>
+                        <m:e>
+                          <m:r>
+                            <a:rPr lang="fr-FR" sz="1400" i="1">
+                              <a:solidFill>
+                                <a:schemeClr val="bg1"/>
+                              </a:solidFill>
                               <a:latin typeface="Cambria Math" panose="02040503050406030204" pitchFamily="18" charset="0"/>
                             </a:rPr>
                             <m:t>𝑠</m:t>
@@ -10711,7 +11729,11 @@
                     </m:oMath>
                   </m:oMathPara>
                 </a14:m>
-                <a:endParaRPr lang="fr-FR" dirty="0"/>
+                <a:endParaRPr lang="fr-FR" sz="1400" dirty="0">
+                  <a:solidFill>
+                    <a:schemeClr val="bg1"/>
+                  </a:solidFill>
+                </a:endParaRPr>
               </a:p>
             </p:txBody>
           </p:sp>
@@ -10719,10 +11741,10 @@
         <mc:Fallback>
           <p:sp>
             <p:nvSpPr>
-              <p:cNvPr id="13" name="ZoneTexte 12">
+              <p:cNvPr id="5" name="ZoneTexte 4">
                 <a:extLst>
                   <a:ext uri="{FF2B5EF4-FFF2-40B4-BE49-F238E27FC236}">
-                    <a16:creationId xmlns:a16="http://schemas.microsoft.com/office/drawing/2014/main" id="{F4F497C3-B171-BB7D-D4FE-DCABFC91E315}"/>
+                    <a16:creationId xmlns:a16="http://schemas.microsoft.com/office/drawing/2014/main" id="{8A10CA1A-8BD0-3151-3D8C-E231B70E004B}"/>
                   </a:ext>
                 </a:extLst>
               </p:cNvPr>
@@ -10733,768 +11755,8 @@
             </p:nvSpPr>
             <p:spPr>
               <a:xfrm>
-                <a:off x="5029200" y="4841871"/>
-                <a:ext cx="1117600" cy="440185"/>
-              </a:xfrm>
-              <a:prstGeom prst="rect">
-                <a:avLst/>
-              </a:prstGeom>
-              <a:blipFill>
-                <a:blip r:embed="rId5"/>
-                <a:stretch>
-                  <a:fillRect b="-1389"/>
-                </a:stretch>
-              </a:blipFill>
-            </p:spPr>
-            <p:txBody>
-              <a:bodyPr/>
-              <a:lstStyle/>
-              <a:p>
-                <a:r>
-                  <a:rPr lang="fr-FR">
-                    <a:noFill/>
-                  </a:rPr>
-                  <a:t> </a:t>
-                </a:r>
-              </a:p>
-            </p:txBody>
-          </p:sp>
-        </mc:Fallback>
-      </mc:AlternateContent>
-      <p:cxnSp>
-        <p:nvCxnSpPr>
-          <p:cNvPr id="14" name="Connecteur droit avec flèche 13">
-            <a:extLst>
-              <a:ext uri="{FF2B5EF4-FFF2-40B4-BE49-F238E27FC236}">
-                <a16:creationId xmlns:a16="http://schemas.microsoft.com/office/drawing/2014/main" id="{C8273C9B-D359-7061-0EA3-3B72B5AAE735}"/>
-              </a:ext>
-            </a:extLst>
-          </p:cNvPr>
-          <p:cNvCxnSpPr>
-            <a:cxnSpLocks/>
-            <a:endCxn id="9" idx="0"/>
-          </p:cNvCxnSpPr>
-          <p:nvPr/>
-        </p:nvCxnSpPr>
-        <p:spPr>
-          <a:xfrm flipH="1">
-            <a:off x="4857750" y="5324068"/>
-            <a:ext cx="590552" cy="859101"/>
-          </a:xfrm>
-          <a:prstGeom prst="straightConnector1">
-            <a:avLst/>
-          </a:prstGeom>
-          <a:ln w="9525">
-            <a:solidFill>
-              <a:schemeClr val="tx1"/>
-            </a:solidFill>
-            <a:tailEnd type="triangle"/>
-          </a:ln>
-        </p:spPr>
-        <p:style>
-          <a:lnRef idx="2">
-            <a:schemeClr val="accent1"/>
-          </a:lnRef>
-          <a:fillRef idx="0">
-            <a:schemeClr val="accent1"/>
-          </a:fillRef>
-          <a:effectRef idx="1">
-            <a:schemeClr val="accent1"/>
-          </a:effectRef>
-          <a:fontRef idx="minor">
-            <a:schemeClr val="tx1"/>
-          </a:fontRef>
-        </p:style>
-      </p:cxnSp>
-      <p:cxnSp>
-        <p:nvCxnSpPr>
-          <p:cNvPr id="19" name="Connecteur droit avec flèche 18">
-            <a:extLst>
-              <a:ext uri="{FF2B5EF4-FFF2-40B4-BE49-F238E27FC236}">
-                <a16:creationId xmlns:a16="http://schemas.microsoft.com/office/drawing/2014/main" id="{8024077A-B712-2E3B-E127-A93617CB6C23}"/>
-              </a:ext>
-            </a:extLst>
-          </p:cNvPr>
-          <p:cNvCxnSpPr>
-            <a:cxnSpLocks/>
-            <a:endCxn id="7" idx="0"/>
-          </p:cNvCxnSpPr>
-          <p:nvPr/>
-        </p:nvCxnSpPr>
-        <p:spPr>
-          <a:xfrm>
-            <a:off x="2663825" y="4675332"/>
-            <a:ext cx="358777" cy="1507837"/>
-          </a:xfrm>
-          <a:prstGeom prst="straightConnector1">
-            <a:avLst/>
-          </a:prstGeom>
-          <a:ln w="9525">
-            <a:solidFill>
-              <a:schemeClr val="tx1"/>
-            </a:solidFill>
-            <a:tailEnd type="triangle"/>
-          </a:ln>
-        </p:spPr>
-        <p:style>
-          <a:lnRef idx="2">
-            <a:schemeClr val="accent1"/>
-          </a:lnRef>
-          <a:fillRef idx="0">
-            <a:schemeClr val="accent1"/>
-          </a:fillRef>
-          <a:effectRef idx="1">
-            <a:schemeClr val="accent1"/>
-          </a:effectRef>
-          <a:fontRef idx="minor">
-            <a:schemeClr val="tx1"/>
-          </a:fontRef>
-        </p:style>
-      </p:cxnSp>
-      <p:cxnSp>
-        <p:nvCxnSpPr>
-          <p:cNvPr id="22" name="Connecteur droit avec flèche 21">
-            <a:extLst>
-              <a:ext uri="{FF2B5EF4-FFF2-40B4-BE49-F238E27FC236}">
-                <a16:creationId xmlns:a16="http://schemas.microsoft.com/office/drawing/2014/main" id="{DB33F015-D8E7-6DB8-6B8B-E8252FDCF861}"/>
-              </a:ext>
-            </a:extLst>
-          </p:cNvPr>
-          <p:cNvCxnSpPr>
-            <a:cxnSpLocks/>
-            <a:stCxn id="5" idx="2"/>
-            <a:endCxn id="13" idx="1"/>
-          </p:cNvCxnSpPr>
-          <p:nvPr/>
-        </p:nvCxnSpPr>
-        <p:spPr>
-          <a:xfrm>
-            <a:off x="3600450" y="4675332"/>
-            <a:ext cx="1428750" cy="386632"/>
-          </a:xfrm>
-          <a:prstGeom prst="straightConnector1">
-            <a:avLst/>
-          </a:prstGeom>
-          <a:ln w="9525">
-            <a:solidFill>
-              <a:schemeClr val="tx1"/>
-            </a:solidFill>
-            <a:tailEnd type="triangle"/>
-          </a:ln>
-        </p:spPr>
-        <p:style>
-          <a:lnRef idx="2">
-            <a:schemeClr val="accent1"/>
-          </a:lnRef>
-          <a:fillRef idx="0">
-            <a:schemeClr val="accent1"/>
-          </a:fillRef>
-          <a:effectRef idx="1">
-            <a:schemeClr val="accent1"/>
-          </a:effectRef>
-          <a:fontRef idx="minor">
-            <a:schemeClr val="tx1"/>
-          </a:fontRef>
-        </p:style>
-      </p:cxnSp>
-      <p:cxnSp>
-        <p:nvCxnSpPr>
-          <p:cNvPr id="27" name="Connecteur droit avec flèche 26">
-            <a:extLst>
-              <a:ext uri="{FF2B5EF4-FFF2-40B4-BE49-F238E27FC236}">
-                <a16:creationId xmlns:a16="http://schemas.microsoft.com/office/drawing/2014/main" id="{C8754EA8-5992-E327-26D3-1C9760C4C102}"/>
-              </a:ext>
-            </a:extLst>
-          </p:cNvPr>
-          <p:cNvCxnSpPr>
-            <a:cxnSpLocks/>
-            <a:endCxn id="5" idx="0"/>
-          </p:cNvCxnSpPr>
-          <p:nvPr/>
-        </p:nvCxnSpPr>
-        <p:spPr>
-          <a:xfrm>
-            <a:off x="3022602" y="3496830"/>
-            <a:ext cx="577848" cy="794038"/>
-          </a:xfrm>
-          <a:prstGeom prst="straightConnector1">
-            <a:avLst/>
-          </a:prstGeom>
-          <a:ln w="9525">
-            <a:solidFill>
-              <a:schemeClr val="tx1"/>
-            </a:solidFill>
-            <a:tailEnd type="triangle"/>
-          </a:ln>
-        </p:spPr>
-        <p:style>
-          <a:lnRef idx="2">
-            <a:schemeClr val="accent1"/>
-          </a:lnRef>
-          <a:fillRef idx="0">
-            <a:schemeClr val="accent1"/>
-          </a:fillRef>
-          <a:effectRef idx="1">
-            <a:schemeClr val="accent1"/>
-          </a:effectRef>
-          <a:fontRef idx="minor">
-            <a:schemeClr val="tx1"/>
-          </a:fontRef>
-        </p:style>
-      </p:cxnSp>
-      <p:sp>
-        <p:nvSpPr>
-          <p:cNvPr id="30" name="Ellipse 29">
-            <a:extLst>
-              <a:ext uri="{FF2B5EF4-FFF2-40B4-BE49-F238E27FC236}">
-                <a16:creationId xmlns:a16="http://schemas.microsoft.com/office/drawing/2014/main" id="{349618D7-4392-383E-5042-14600201A1FF}"/>
-              </a:ext>
-            </a:extLst>
-          </p:cNvPr>
-          <p:cNvSpPr/>
-          <p:nvPr/>
-        </p:nvSpPr>
-        <p:spPr>
-          <a:xfrm>
-            <a:off x="2382292" y="2864098"/>
-            <a:ext cx="693242" cy="577602"/>
-          </a:xfrm>
-          <a:prstGeom prst="ellipse">
-            <a:avLst/>
-          </a:prstGeom>
-          <a:noFill/>
-          <a:ln w="9525">
-            <a:solidFill>
-              <a:schemeClr val="tx1"/>
-            </a:solidFill>
-            <a:prstDash val="dash"/>
-          </a:ln>
-        </p:spPr>
-        <p:style>
-          <a:lnRef idx="2">
-            <a:schemeClr val="accent1">
-              <a:shade val="15000"/>
-            </a:schemeClr>
-          </a:lnRef>
-          <a:fillRef idx="1">
-            <a:schemeClr val="accent1"/>
-          </a:fillRef>
-          <a:effectRef idx="0">
-            <a:schemeClr val="accent1"/>
-          </a:effectRef>
-          <a:fontRef idx="minor">
-            <a:schemeClr val="lt1"/>
-          </a:fontRef>
-        </p:style>
-        <p:txBody>
-          <a:bodyPr rtlCol="0" anchor="ctr"/>
-          <a:lstStyle/>
-          <a:p>
-            <a:pPr algn="ctr"/>
-            <a:r>
-              <a:rPr lang="fr-FR" dirty="0">
-                <a:solidFill>
-                  <a:schemeClr val="tx1"/>
-                </a:solidFill>
-              </a:rPr>
-              <a:t>W</a:t>
-            </a:r>
-          </a:p>
-        </p:txBody>
-      </p:sp>
-      <p:cxnSp>
-        <p:nvCxnSpPr>
-          <p:cNvPr id="31" name="Connecteur droit avec flèche 30">
-            <a:extLst>
-              <a:ext uri="{FF2B5EF4-FFF2-40B4-BE49-F238E27FC236}">
-                <a16:creationId xmlns:a16="http://schemas.microsoft.com/office/drawing/2014/main" id="{BED2E224-DC23-91B0-495D-27F6491F3EEE}"/>
-              </a:ext>
-            </a:extLst>
-          </p:cNvPr>
-          <p:cNvCxnSpPr>
-            <a:cxnSpLocks/>
-          </p:cNvCxnSpPr>
-          <p:nvPr/>
-        </p:nvCxnSpPr>
-        <p:spPr>
-          <a:xfrm>
-            <a:off x="1895476" y="1943652"/>
-            <a:ext cx="577848" cy="794038"/>
-          </a:xfrm>
-          <a:prstGeom prst="straightConnector1">
-            <a:avLst/>
-          </a:prstGeom>
-          <a:ln w="9525">
-            <a:solidFill>
-              <a:schemeClr val="tx1"/>
-            </a:solidFill>
-            <a:tailEnd type="triangle"/>
-          </a:ln>
-        </p:spPr>
-        <p:style>
-          <a:lnRef idx="2">
-            <a:schemeClr val="accent1"/>
-          </a:lnRef>
-          <a:fillRef idx="0">
-            <a:schemeClr val="accent1"/>
-          </a:fillRef>
-          <a:effectRef idx="1">
-            <a:schemeClr val="accent1"/>
-          </a:effectRef>
-          <a:fontRef idx="minor">
-            <a:schemeClr val="tx1"/>
-          </a:fontRef>
-        </p:style>
-      </p:cxnSp>
-      <p:cxnSp>
-        <p:nvCxnSpPr>
-          <p:cNvPr id="32" name="Connecteur droit 31">
-            <a:extLst>
-              <a:ext uri="{FF2B5EF4-FFF2-40B4-BE49-F238E27FC236}">
-                <a16:creationId xmlns:a16="http://schemas.microsoft.com/office/drawing/2014/main" id="{EBD6BBD8-29A8-A149-B362-3BC09E05AC23}"/>
-              </a:ext>
-            </a:extLst>
-          </p:cNvPr>
-          <p:cNvCxnSpPr>
-            <a:cxnSpLocks/>
-          </p:cNvCxnSpPr>
-          <p:nvPr/>
-        </p:nvCxnSpPr>
-        <p:spPr>
-          <a:xfrm>
-            <a:off x="156053" y="2411268"/>
-            <a:ext cx="10638947" cy="1917"/>
-          </a:xfrm>
-          <a:prstGeom prst="line">
-            <a:avLst/>
-          </a:prstGeom>
-          <a:ln w="9525">
-            <a:solidFill>
-              <a:schemeClr val="tx1"/>
-            </a:solidFill>
-            <a:prstDash val="dash"/>
-          </a:ln>
-        </p:spPr>
-        <p:style>
-          <a:lnRef idx="2">
-            <a:schemeClr val="accent1"/>
-          </a:lnRef>
-          <a:fillRef idx="0">
-            <a:schemeClr val="accent1"/>
-          </a:fillRef>
-          <a:effectRef idx="1">
-            <a:schemeClr val="accent1"/>
-          </a:effectRef>
-          <a:fontRef idx="minor">
-            <a:schemeClr val="tx1"/>
-          </a:fontRef>
-        </p:style>
-      </p:cxnSp>
-      <p:cxnSp>
-        <p:nvCxnSpPr>
-          <p:cNvPr id="33" name="Connecteur droit avec flèche 32">
-            <a:extLst>
-              <a:ext uri="{FF2B5EF4-FFF2-40B4-BE49-F238E27FC236}">
-                <a16:creationId xmlns:a16="http://schemas.microsoft.com/office/drawing/2014/main" id="{5D75F9C1-C1B6-E056-CE1D-53A859332BC2}"/>
-              </a:ext>
-            </a:extLst>
-          </p:cNvPr>
-          <p:cNvCxnSpPr>
-            <a:cxnSpLocks/>
-            <a:stCxn id="39" idx="2"/>
-          </p:cNvCxnSpPr>
-          <p:nvPr/>
-        </p:nvCxnSpPr>
-        <p:spPr>
-          <a:xfrm>
-            <a:off x="3661041" y="1939390"/>
-            <a:ext cx="53711" cy="2351478"/>
-          </a:xfrm>
-          <a:prstGeom prst="straightConnector1">
-            <a:avLst/>
-          </a:prstGeom>
-          <a:ln w="9525">
-            <a:solidFill>
-              <a:schemeClr val="tx1"/>
-            </a:solidFill>
-            <a:tailEnd type="triangle"/>
-          </a:ln>
-        </p:spPr>
-        <p:style>
-          <a:lnRef idx="2">
-            <a:schemeClr val="accent1"/>
-          </a:lnRef>
-          <a:fillRef idx="0">
-            <a:schemeClr val="accent1"/>
-          </a:fillRef>
-          <a:effectRef idx="1">
-            <a:schemeClr val="accent1"/>
-          </a:effectRef>
-          <a:fontRef idx="minor">
-            <a:schemeClr val="tx1"/>
-          </a:fontRef>
-        </p:style>
-      </p:cxnSp>
-      <mc:AlternateContent xmlns:mc="http://schemas.openxmlformats.org/markup-compatibility/2006">
-        <mc:Choice xmlns:a14="http://schemas.microsoft.com/office/drawing/2010/main" Requires="a14">
-          <p:sp>
-            <p:nvSpPr>
-              <p:cNvPr id="39" name="ZoneTexte 38">
-                <a:extLst>
-                  <a:ext uri="{FF2B5EF4-FFF2-40B4-BE49-F238E27FC236}">
-                    <a16:creationId xmlns:a16="http://schemas.microsoft.com/office/drawing/2014/main" id="{52D4E2EC-C2DE-0CDD-3AA9-E3F59AAA1703}"/>
-                  </a:ext>
-                </a:extLst>
-              </p:cNvPr>
-              <p:cNvSpPr txBox="1"/>
-              <p:nvPr/>
-            </p:nvSpPr>
-            <p:spPr>
-              <a:xfrm>
-                <a:off x="2394216" y="1069472"/>
-                <a:ext cx="2533650" cy="869918"/>
-              </a:xfrm>
-              <a:prstGeom prst="rect">
-                <a:avLst/>
-              </a:prstGeom>
-              <a:noFill/>
-            </p:spPr>
-            <p:txBody>
-              <a:bodyPr wrap="square">
-                <a:spAutoFit/>
-              </a:bodyPr>
-              <a:lstStyle/>
-              <a:p>
-                <a:pPr/>
-                <a14:m>
-                  <m:oMathPara xmlns:m="http://schemas.openxmlformats.org/officeDocument/2006/math">
-                    <m:oMathParaPr>
-                      <m:jc m:val="centerGroup"/>
-                    </m:oMathParaPr>
-                    <m:oMath xmlns:m="http://schemas.openxmlformats.org/officeDocument/2006/math">
-                      <m:sSub>
-                        <m:sSubPr>
-                          <m:ctrlPr>
-                            <a:rPr lang="fr-FR" i="1" smtClean="0">
-                              <a:latin typeface="Cambria Math" panose="02040503050406030204" pitchFamily="18" charset="0"/>
-                            </a:rPr>
-                          </m:ctrlPr>
-                        </m:sSubPr>
-                        <m:e>
-                          <m:r>
-                            <a:rPr lang="fr-FR" i="1">
-                              <a:latin typeface="Cambria Math" panose="02040503050406030204" pitchFamily="18" charset="0"/>
-                            </a:rPr>
-                            <m:t>𝛼</m:t>
-                          </m:r>
-                        </m:e>
-                        <m:sub>
-                          <m:r>
-                            <a:rPr lang="fr-FR" i="0">
-                              <a:latin typeface="Cambria Math" panose="02040503050406030204" pitchFamily="18" charset="0"/>
-                            </a:rPr>
-                            <m:t>0</m:t>
-                          </m:r>
-                        </m:sub>
-                      </m:sSub>
-                      <m:r>
-                        <a:rPr lang="fr-FR" i="0">
-                          <a:latin typeface="Cambria Math" panose="02040503050406030204" pitchFamily="18" charset="0"/>
-                        </a:rPr>
-                        <m:t>+</m:t>
-                      </m:r>
-                      <m:nary>
-                        <m:naryPr>
-                          <m:chr m:val="∑"/>
-                          <m:limLoc m:val="undOvr"/>
-                          <m:ctrlPr>
-                            <a:rPr lang="fr-FR" i="1">
-                              <a:latin typeface="Cambria Math" panose="02040503050406030204" pitchFamily="18" charset="0"/>
-                            </a:rPr>
-                          </m:ctrlPr>
-                        </m:naryPr>
-                        <m:sub>
-                          <m:r>
-                            <a:rPr lang="fr-FR" i="1">
-                              <a:latin typeface="Cambria Math" panose="02040503050406030204" pitchFamily="18" charset="0"/>
-                            </a:rPr>
-                            <m:t>𝑘</m:t>
-                          </m:r>
-                          <m:r>
-                            <a:rPr lang="fr-FR" i="0">
-                              <a:latin typeface="Cambria Math" panose="02040503050406030204" pitchFamily="18" charset="0"/>
-                            </a:rPr>
-                            <m:t>=1</m:t>
-                          </m:r>
-                        </m:sub>
-                        <m:sup>
-                          <m:r>
-                            <a:rPr lang="fr-FR" i="0">
-                              <a:latin typeface="Cambria Math" panose="02040503050406030204" pitchFamily="18" charset="0"/>
-                            </a:rPr>
-                            <m:t>4</m:t>
-                          </m:r>
-                        </m:sup>
-                        <m:e>
-                          <m:sSub>
-                            <m:sSubPr>
-                              <m:ctrlPr>
-                                <a:rPr lang="fr-FR" i="1">
-                                  <a:latin typeface="Cambria Math" panose="02040503050406030204" pitchFamily="18" charset="0"/>
-                                </a:rPr>
-                              </m:ctrlPr>
-                            </m:sSubPr>
-                            <m:e>
-                              <m:r>
-                                <a:rPr lang="fr-FR" i="1">
-                                  <a:latin typeface="Cambria Math" panose="02040503050406030204" pitchFamily="18" charset="0"/>
-                                </a:rPr>
-                                <m:t>𝛼</m:t>
-                              </m:r>
-                            </m:e>
-                            <m:sub>
-                              <m:r>
-                                <a:rPr lang="fr-FR" i="1">
-                                  <a:latin typeface="Cambria Math" panose="02040503050406030204" pitchFamily="18" charset="0"/>
-                                </a:rPr>
-                                <m:t>𝑘</m:t>
-                              </m:r>
-                            </m:sub>
-                          </m:sSub>
-                          <m:sSub>
-                            <m:sSubPr>
-                              <m:ctrlPr>
-                                <a:rPr lang="fr-FR" i="1">
-                                  <a:latin typeface="Cambria Math" panose="02040503050406030204" pitchFamily="18" charset="0"/>
-                                </a:rPr>
-                              </m:ctrlPr>
-                            </m:sSubPr>
-                            <m:e>
-                              <m:r>
-                                <m:rPr>
-                                  <m:nor/>
-                                </m:rPr>
-                                <a:rPr lang="fr-FR" b="0" i="1">
-                                  <a:latin typeface="Cambria Math" panose="02040503050406030204" pitchFamily="18" charset="0"/>
-                                </a:rPr>
-                                <m:t>PC</m:t>
-                              </m:r>
-                            </m:e>
-                            <m:sub>
-                              <m:r>
-                                <a:rPr lang="fr-FR" b="0" i="1">
-                                  <a:latin typeface="Cambria Math" panose="02040503050406030204" pitchFamily="18" charset="0"/>
-                                </a:rPr>
-                                <m:t>𝑘</m:t>
-                              </m:r>
-                            </m:sub>
-                          </m:sSub>
-                          <m:d>
-                            <m:dPr>
-                              <m:ctrlPr>
-                                <a:rPr lang="fr-FR" b="0" i="1">
-                                  <a:latin typeface="Cambria Math" panose="02040503050406030204" pitchFamily="18" charset="0"/>
-                                </a:rPr>
-                              </m:ctrlPr>
-                            </m:dPr>
-                            <m:e>
-                              <m:r>
-                                <a:rPr lang="fr-FR" b="0" i="1">
-                                  <a:latin typeface="Cambria Math" panose="02040503050406030204" pitchFamily="18" charset="0"/>
-                                </a:rPr>
-                                <m:t>𝑠</m:t>
-                              </m:r>
-                            </m:e>
-                          </m:d>
-                        </m:e>
-                      </m:nary>
-                    </m:oMath>
-                  </m:oMathPara>
-                </a14:m>
-                <a:endParaRPr lang="fr-FR" dirty="0"/>
-              </a:p>
-            </p:txBody>
-          </p:sp>
-        </mc:Choice>
-        <mc:Fallback>
-          <p:sp>
-            <p:nvSpPr>
-              <p:cNvPr id="39" name="ZoneTexte 38">
-                <a:extLst>
-                  <a:ext uri="{FF2B5EF4-FFF2-40B4-BE49-F238E27FC236}">
-                    <a16:creationId xmlns:a16="http://schemas.microsoft.com/office/drawing/2014/main" id="{52D4E2EC-C2DE-0CDD-3AA9-E3F59AAA1703}"/>
-                  </a:ext>
-                </a:extLst>
-              </p:cNvPr>
-              <p:cNvSpPr txBox="1">
-                <a:spLocks noRot="1" noChangeAspect="1" noMove="1" noResize="1" noEditPoints="1" noAdjustHandles="1" noChangeArrowheads="1" noChangeShapeType="1" noTextEdit="1"/>
-              </p:cNvSpPr>
-              <p:nvPr/>
-            </p:nvSpPr>
-            <p:spPr>
-              <a:xfrm>
-                <a:off x="2394216" y="1069472"/>
-                <a:ext cx="2533650" cy="869918"/>
-              </a:xfrm>
-              <a:prstGeom prst="rect">
-                <a:avLst/>
-              </a:prstGeom>
-              <a:blipFill>
-                <a:blip r:embed="rId6"/>
-                <a:stretch>
-                  <a:fillRect/>
-                </a:stretch>
-              </a:blipFill>
-            </p:spPr>
-            <p:txBody>
-              <a:bodyPr/>
-              <a:lstStyle/>
-              <a:p>
-                <a:r>
-                  <a:rPr lang="fr-FR">
-                    <a:noFill/>
-                  </a:rPr>
-                  <a:t> </a:t>
-                </a:r>
-              </a:p>
-            </p:txBody>
-          </p:sp>
-        </mc:Fallback>
-      </mc:AlternateContent>
-      <mc:AlternateContent xmlns:mc="http://schemas.openxmlformats.org/markup-compatibility/2006">
-        <mc:Choice xmlns:a14="http://schemas.microsoft.com/office/drawing/2010/main" Requires="a14">
-          <p:sp>
-            <p:nvSpPr>
-              <p:cNvPr id="41" name="ZoneTexte 40">
-                <a:extLst>
-                  <a:ext uri="{FF2B5EF4-FFF2-40B4-BE49-F238E27FC236}">
-                    <a16:creationId xmlns:a16="http://schemas.microsoft.com/office/drawing/2014/main" id="{BDE6D118-2332-0E41-1CD1-DAC2919B3946}"/>
-                  </a:ext>
-                </a:extLst>
-              </p:cNvPr>
-              <p:cNvSpPr txBox="1"/>
-              <p:nvPr/>
-            </p:nvSpPr>
-            <p:spPr>
-              <a:xfrm>
-                <a:off x="1175792" y="1273868"/>
-                <a:ext cx="1206500" cy="506870"/>
-              </a:xfrm>
-              <a:prstGeom prst="rect">
-                <a:avLst/>
-              </a:prstGeom>
-              <a:noFill/>
-            </p:spPr>
-            <p:txBody>
-              <a:bodyPr wrap="square">
-                <a:spAutoFit/>
-              </a:bodyPr>
-              <a:lstStyle/>
-              <a:p>
-                <a:pPr/>
-                <a14:m>
-                  <m:oMathPara xmlns:m="http://schemas.openxmlformats.org/officeDocument/2006/math">
-                    <m:oMathParaPr>
-                      <m:jc m:val="centerGroup"/>
-                    </m:oMathParaPr>
-                    <m:oMath xmlns:m="http://schemas.openxmlformats.org/officeDocument/2006/math">
-                      <m:d>
-                        <m:dPr>
-                          <m:sepChr m:val=","/>
-                          <m:ctrlPr>
-                            <a:rPr lang="fr-FR" i="1" smtClean="0">
-                              <a:latin typeface="Cambria Math" panose="02040503050406030204" pitchFamily="18" charset="0"/>
-                            </a:rPr>
-                          </m:ctrlPr>
-                        </m:dPr>
-                        <m:e>
-                          <m:sSup>
-                            <m:sSupPr>
-                              <m:ctrlPr>
-                                <a:rPr lang="fr-FR" i="1">
-                                  <a:latin typeface="Cambria Math" panose="02040503050406030204" pitchFamily="18" charset="0"/>
-                                </a:rPr>
-                              </m:ctrlPr>
-                            </m:sSupPr>
-                            <m:e>
-                              <m:r>
-                                <a:rPr lang="fr-FR" i="1">
-                                  <a:latin typeface="Cambria Math" panose="02040503050406030204" pitchFamily="18" charset="0"/>
-                                </a:rPr>
-                                <m:t>𝜌</m:t>
-                              </m:r>
-                            </m:e>
-                            <m:sup>
-                              <m:r>
-                                <m:rPr>
-                                  <m:nor/>
-                                </m:rPr>
-                                <a:rPr lang="fr-FR" b="0" i="1">
-                                  <a:latin typeface="Cambria Math" panose="02040503050406030204" pitchFamily="18" charset="0"/>
-                                </a:rPr>
-                                <m:t>lv</m:t>
-                              </m:r>
-                            </m:sup>
-                          </m:sSup>
-                        </m:e>
-                        <m:e>
-                          <m:sSup>
-                            <m:sSupPr>
-                              <m:ctrlPr>
-                                <a:rPr lang="fr-FR" b="0" i="1">
-                                  <a:latin typeface="Cambria Math" panose="02040503050406030204" pitchFamily="18" charset="0"/>
-                                </a:rPr>
-                              </m:ctrlPr>
-                            </m:sSupPr>
-                            <m:e>
-                              <m:r>
-                                <a:rPr lang="fr-FR" b="0" i="1">
-                                  <a:latin typeface="Cambria Math" panose="02040503050406030204" pitchFamily="18" charset="0"/>
-                                </a:rPr>
-                                <m:t>𝜎</m:t>
-                              </m:r>
-                            </m:e>
-                            <m:sup>
-                              <m:r>
-                                <m:rPr>
-                                  <m:nor/>
-                                </m:rPr>
-                                <a:rPr lang="fr-FR" b="0" i="1">
-                                  <a:latin typeface="Cambria Math" panose="02040503050406030204" pitchFamily="18" charset="0"/>
-                                </a:rPr>
-                                <m:t>lv</m:t>
-                              </m:r>
-                            </m:sup>
-                          </m:sSup>
-                        </m:e>
-                      </m:d>
-                    </m:oMath>
-                  </m:oMathPara>
-                </a14:m>
-                <a:endParaRPr lang="fr-FR" dirty="0"/>
-              </a:p>
-            </p:txBody>
-          </p:sp>
-        </mc:Choice>
-        <mc:Fallback>
-          <p:sp>
-            <p:nvSpPr>
-              <p:cNvPr id="41" name="ZoneTexte 40">
-                <a:extLst>
-                  <a:ext uri="{FF2B5EF4-FFF2-40B4-BE49-F238E27FC236}">
-                    <a16:creationId xmlns:a16="http://schemas.microsoft.com/office/drawing/2014/main" id="{BDE6D118-2332-0E41-1CD1-DAC2919B3946}"/>
-                  </a:ext>
-                </a:extLst>
-              </p:cNvPr>
-              <p:cNvSpPr txBox="1">
-                <a:spLocks noRot="1" noChangeAspect="1" noMove="1" noResize="1" noEditPoints="1" noAdjustHandles="1" noChangeArrowheads="1" noChangeShapeType="1" noTextEdit="1"/>
-              </p:cNvSpPr>
-              <p:nvPr/>
-            </p:nvSpPr>
-            <p:spPr>
-              <a:xfrm>
-                <a:off x="1175792" y="1273868"/>
-                <a:ext cx="1206500" cy="506870"/>
+                <a:off x="3279814" y="3336267"/>
+                <a:ext cx="2857500" cy="319511"/>
               </a:xfrm>
               <a:prstGeom prst="rect">
                 <a:avLst/>
@@ -11525,10 +11787,10 @@
         <mc:Choice xmlns:a14="http://schemas.microsoft.com/office/drawing/2010/main" Requires="a14">
           <p:sp>
             <p:nvSpPr>
-              <p:cNvPr id="43" name="ZoneTexte 42">
+              <p:cNvPr id="35" name="ZoneTexte 34">
                 <a:extLst>
                   <a:ext uri="{FF2B5EF4-FFF2-40B4-BE49-F238E27FC236}">
-                    <a16:creationId xmlns:a16="http://schemas.microsoft.com/office/drawing/2014/main" id="{1870A238-5085-F25E-3800-44C8411B84B1}"/>
+                    <a16:creationId xmlns:a16="http://schemas.microsoft.com/office/drawing/2014/main" id="{7EEF00BE-A8AE-C883-D38B-5A770B21440A}"/>
                   </a:ext>
                 </a:extLst>
               </p:cNvPr>
@@ -11537,8 +11799,8 @@
             </p:nvSpPr>
             <p:spPr>
               <a:xfrm>
-                <a:off x="8693150" y="1324668"/>
-                <a:ext cx="2413000" cy="369332"/>
+                <a:off x="7489969" y="5058216"/>
+                <a:ext cx="1117600" cy="307777"/>
               </a:xfrm>
               <a:prstGeom prst="rect">
                 <a:avLst/>
@@ -11561,14 +11823,247 @@
                       <m:sSub>
                         <m:sSubPr>
                           <m:ctrlPr>
-                            <a:rPr lang="fr-FR" i="1" smtClean="0">
+                            <a:rPr lang="fr-FR" sz="1400" i="1" smtClean="0">
                               <a:latin typeface="Cambria Math" panose="02040503050406030204" pitchFamily="18" charset="0"/>
                             </a:rPr>
                           </m:ctrlPr>
                         </m:sSubPr>
                         <m:e>
                           <m:r>
-                            <a:rPr lang="fr-FR" i="1">
+                            <a:rPr lang="fr-FR" sz="1400" i="1">
+                              <a:latin typeface="Cambria Math" panose="02040503050406030204" pitchFamily="18" charset="0"/>
+                            </a:rPr>
+                            <m:t>𝑝</m:t>
+                          </m:r>
+                        </m:e>
+                        <m:sub>
+                          <m:r>
+                            <a:rPr lang="fr-FR" sz="1400" b="0" i="1" smtClean="0">
+                              <a:latin typeface="Cambria Math" panose="02040503050406030204" pitchFamily="18" charset="0"/>
+                            </a:rPr>
+                            <m:t>𝑖</m:t>
+                          </m:r>
+                        </m:sub>
+                      </m:sSub>
+                      <m:d>
+                        <m:dPr>
+                          <m:ctrlPr>
+                            <a:rPr lang="fr-FR" sz="1400" b="0" i="1">
+                              <a:latin typeface="Cambria Math" panose="02040503050406030204" pitchFamily="18" charset="0"/>
+                            </a:rPr>
+                          </m:ctrlPr>
+                        </m:dPr>
+                        <m:e>
+                          <m:r>
+                            <a:rPr lang="fr-FR" sz="1400" b="0" i="1">
+                              <a:latin typeface="Cambria Math" panose="02040503050406030204" pitchFamily="18" charset="0"/>
+                            </a:rPr>
+                            <m:t>𝑠</m:t>
+                          </m:r>
+                        </m:e>
+                      </m:d>
+                    </m:oMath>
+                  </m:oMathPara>
+                </a14:m>
+                <a:endParaRPr lang="fr-FR" sz="1400" dirty="0"/>
+              </a:p>
+            </p:txBody>
+          </p:sp>
+        </mc:Choice>
+        <mc:Fallback>
+          <p:sp>
+            <p:nvSpPr>
+              <p:cNvPr id="35" name="ZoneTexte 34">
+                <a:extLst>
+                  <a:ext uri="{FF2B5EF4-FFF2-40B4-BE49-F238E27FC236}">
+                    <a16:creationId xmlns:a16="http://schemas.microsoft.com/office/drawing/2014/main" id="{7EEF00BE-A8AE-C883-D38B-5A770B21440A}"/>
+                  </a:ext>
+                </a:extLst>
+              </p:cNvPr>
+              <p:cNvSpPr txBox="1">
+                <a:spLocks noRot="1" noChangeAspect="1" noMove="1" noResize="1" noEditPoints="1" noAdjustHandles="1" noChangeArrowheads="1" noChangeShapeType="1" noTextEdit="1"/>
+              </p:cNvSpPr>
+              <p:nvPr/>
+            </p:nvSpPr>
+            <p:spPr>
+              <a:xfrm>
+                <a:off x="7489969" y="5058216"/>
+                <a:ext cx="1117600" cy="307777"/>
+              </a:xfrm>
+              <a:prstGeom prst="rect">
+                <a:avLst/>
+              </a:prstGeom>
+              <a:blipFill>
+                <a:blip r:embed="rId8"/>
+                <a:stretch>
+                  <a:fillRect b="-2000"/>
+                </a:stretch>
+              </a:blipFill>
+            </p:spPr>
+            <p:txBody>
+              <a:bodyPr/>
+              <a:lstStyle/>
+              <a:p>
+                <a:r>
+                  <a:rPr lang="fr-FR">
+                    <a:noFill/>
+                  </a:rPr>
+                  <a:t> </a:t>
+                </a:r>
+              </a:p>
+            </p:txBody>
+          </p:sp>
+        </mc:Fallback>
+      </mc:AlternateContent>
+      <p:cxnSp>
+        <p:nvCxnSpPr>
+          <p:cNvPr id="38" name="Connecteur droit avec flèche 37">
+            <a:extLst>
+              <a:ext uri="{FF2B5EF4-FFF2-40B4-BE49-F238E27FC236}">
+                <a16:creationId xmlns:a16="http://schemas.microsoft.com/office/drawing/2014/main" id="{989223B0-BF01-99EC-E84A-F895458EA4EA}"/>
+              </a:ext>
+            </a:extLst>
+          </p:cNvPr>
+          <p:cNvCxnSpPr>
+            <a:cxnSpLocks/>
+            <a:stCxn id="13" idx="1"/>
+          </p:cNvCxnSpPr>
+          <p:nvPr/>
+        </p:nvCxnSpPr>
+        <p:spPr>
+          <a:xfrm flipH="1">
+            <a:off x="5233233" y="5206793"/>
+            <a:ext cx="1100892" cy="0"/>
+          </a:xfrm>
+          <a:prstGeom prst="straightConnector1">
+            <a:avLst/>
+          </a:prstGeom>
+          <a:ln w="9525">
+            <a:solidFill>
+              <a:schemeClr val="tx1"/>
+            </a:solidFill>
+            <a:tailEnd type="triangle"/>
+          </a:ln>
+        </p:spPr>
+        <p:style>
+          <a:lnRef idx="2">
+            <a:schemeClr val="accent1"/>
+          </a:lnRef>
+          <a:fillRef idx="0">
+            <a:schemeClr val="accent1"/>
+          </a:fillRef>
+          <a:effectRef idx="1">
+            <a:schemeClr val="accent1"/>
+          </a:effectRef>
+          <a:fontRef idx="minor">
+            <a:schemeClr val="tx1"/>
+          </a:fontRef>
+        </p:style>
+      </p:cxnSp>
+      <p:sp>
+        <p:nvSpPr>
+          <p:cNvPr id="82" name="Ellipse 81">
+            <a:extLst>
+              <a:ext uri="{FF2B5EF4-FFF2-40B4-BE49-F238E27FC236}">
+                <a16:creationId xmlns:a16="http://schemas.microsoft.com/office/drawing/2014/main" id="{11739DF6-2A5A-6A8B-5C33-689497B83CEE}"/>
+              </a:ext>
+            </a:extLst>
+          </p:cNvPr>
+          <p:cNvSpPr/>
+          <p:nvPr/>
+        </p:nvSpPr>
+        <p:spPr>
+          <a:xfrm>
+            <a:off x="6616647" y="3471326"/>
+            <a:ext cx="2686444" cy="1232043"/>
+          </a:xfrm>
+          <a:prstGeom prst="ellipse">
+            <a:avLst/>
+          </a:prstGeom>
+          <a:solidFill>
+            <a:srgbClr val="E2DFE3"/>
+          </a:solidFill>
+        </p:spPr>
+        <p:style>
+          <a:lnRef idx="2">
+            <a:schemeClr val="accent1">
+              <a:shade val="15000"/>
+            </a:schemeClr>
+          </a:lnRef>
+          <a:fillRef idx="1">
+            <a:schemeClr val="accent1"/>
+          </a:fillRef>
+          <a:effectRef idx="0">
+            <a:schemeClr val="accent1"/>
+          </a:effectRef>
+          <a:fontRef idx="minor">
+            <a:schemeClr val="lt1"/>
+          </a:fontRef>
+        </p:style>
+        <p:txBody>
+          <a:bodyPr rtlCol="0" anchor="t"/>
+          <a:lstStyle/>
+          <a:p>
+            <a:pPr algn="ctr"/>
+            <a:r>
+              <a:rPr lang="fr-FR" b="1" dirty="0">
+                <a:solidFill>
+                  <a:schemeClr val="tx1"/>
+                </a:solidFill>
+              </a:rPr>
+              <a:t>Sampling model</a:t>
+            </a:r>
+          </a:p>
+        </p:txBody>
+      </p:sp>
+      <mc:AlternateContent xmlns:mc="http://schemas.openxmlformats.org/markup-compatibility/2006">
+        <mc:Choice xmlns:a14="http://schemas.microsoft.com/office/drawing/2010/main" Requires="a14">
+          <p:sp>
+            <p:nvSpPr>
+              <p:cNvPr id="43" name="ZoneTexte 42">
+                <a:extLst>
+                  <a:ext uri="{FF2B5EF4-FFF2-40B4-BE49-F238E27FC236}">
+                    <a16:creationId xmlns:a16="http://schemas.microsoft.com/office/drawing/2014/main" id="{1870A238-5085-F25E-3800-44C8411B84B1}"/>
+                  </a:ext>
+                </a:extLst>
+              </p:cNvPr>
+              <p:cNvSpPr txBox="1"/>
+              <p:nvPr/>
+            </p:nvSpPr>
+            <p:spPr>
+              <a:xfrm>
+                <a:off x="6753369" y="4128239"/>
+                <a:ext cx="2413000" cy="307777"/>
+              </a:xfrm>
+              <a:prstGeom prst="rect">
+                <a:avLst/>
+              </a:prstGeom>
+              <a:noFill/>
+            </p:spPr>
+            <p:txBody>
+              <a:bodyPr wrap="square">
+                <a:spAutoFit/>
+              </a:bodyPr>
+              <a:lstStyle/>
+              <a:p>
+                <a:pPr/>
+                <a14:m>
+                  <m:oMathPara xmlns:m="http://schemas.openxmlformats.org/officeDocument/2006/math">
+                    <m:oMathParaPr>
+                      <m:jc m:val="centerGroup"/>
+                    </m:oMathParaPr>
+                    <m:oMath xmlns:m="http://schemas.openxmlformats.org/officeDocument/2006/math">
+                      <m:sSub>
+                        <m:sSubPr>
+                          <m:ctrlPr>
+                            <a:rPr lang="fr-FR" sz="1400" i="1" smtClean="0">
+                              <a:latin typeface="Cambria Math" panose="02040503050406030204" pitchFamily="18" charset="0"/>
+                            </a:rPr>
+                          </m:ctrlPr>
+                        </m:sSubPr>
+                        <m:e>
+                          <m:r>
+                            <a:rPr lang="fr-FR" sz="1400" i="1">
                               <a:latin typeface="Cambria Math" panose="02040503050406030204" pitchFamily="18" charset="0"/>
                             </a:rPr>
                             <m:t>𝛼</m:t>
@@ -11576,7 +12071,7 @@
                         </m:e>
                         <m:sub>
                           <m:r>
-                            <a:rPr lang="fr-FR" i="0">
+                            <a:rPr lang="fr-FR" sz="1400" i="0">
                               <a:latin typeface="Cambria Math" panose="02040503050406030204" pitchFamily="18" charset="0"/>
                             </a:rPr>
                             <m:t>5</m:t>
@@ -11587,7 +12082,7 @@
                         <m:rPr>
                           <m:nor/>
                         </m:rPr>
-                        <a:rPr lang="fr-FR" b="0" i="1">
+                        <a:rPr lang="fr-FR" sz="1400" b="0" i="1">
                           <a:latin typeface="Cambria Math" panose="02040503050406030204" pitchFamily="18" charset="0"/>
                         </a:rPr>
                         <m:t>SAMPLING</m:t>
@@ -11595,14 +12090,14 @@
                       <m:d>
                         <m:dPr>
                           <m:ctrlPr>
-                            <a:rPr lang="fr-FR" b="0" i="1">
+                            <a:rPr lang="fr-FR" sz="1400" b="0" i="1">
                               <a:latin typeface="Cambria Math" panose="02040503050406030204" pitchFamily="18" charset="0"/>
                             </a:rPr>
                           </m:ctrlPr>
                         </m:dPr>
                         <m:e>
                           <m:r>
-                            <a:rPr lang="fr-FR" b="0" i="1">
+                            <a:rPr lang="fr-FR" sz="1400" b="0" i="1">
                               <a:latin typeface="Cambria Math" panose="02040503050406030204" pitchFamily="18" charset="0"/>
                             </a:rPr>
                             <m:t>𝑠</m:t>
@@ -11612,7 +12107,7 @@
                     </m:oMath>
                   </m:oMathPara>
                 </a14:m>
-                <a:endParaRPr lang="fr-FR" dirty="0"/>
+                <a:endParaRPr lang="fr-FR" sz="1400" dirty="0"/>
               </a:p>
             </p:txBody>
           </p:sp>
@@ -11634,274 +12129,8 @@
             </p:nvSpPr>
             <p:spPr>
               <a:xfrm>
-                <a:off x="8693150" y="1324668"/>
-                <a:ext cx="2413000" cy="369332"/>
-              </a:xfrm>
-              <a:prstGeom prst="rect">
-                <a:avLst/>
-              </a:prstGeom>
-              <a:blipFill>
-                <a:blip r:embed="rId8"/>
-                <a:stretch>
-                  <a:fillRect/>
-                </a:stretch>
-              </a:blipFill>
-            </p:spPr>
-            <p:txBody>
-              <a:bodyPr/>
-              <a:lstStyle/>
-              <a:p>
-                <a:r>
-                  <a:rPr lang="fr-FR">
-                    <a:noFill/>
-                  </a:rPr>
-                  <a:t> </a:t>
-                </a:r>
-              </a:p>
-            </p:txBody>
-          </p:sp>
-        </mc:Fallback>
-      </mc:AlternateContent>
-      <p:cxnSp>
-        <p:nvCxnSpPr>
-          <p:cNvPr id="44" name="Connecteur droit avec flèche 43">
-            <a:extLst>
-              <a:ext uri="{FF2B5EF4-FFF2-40B4-BE49-F238E27FC236}">
-                <a16:creationId xmlns:a16="http://schemas.microsoft.com/office/drawing/2014/main" id="{DAE87AF2-CB0A-56E9-A8CE-E64DD4D49FAE}"/>
-              </a:ext>
-            </a:extLst>
-          </p:cNvPr>
-          <p:cNvCxnSpPr>
-            <a:cxnSpLocks/>
-            <a:stCxn id="43" idx="2"/>
-            <a:endCxn id="13" idx="0"/>
-          </p:cNvCxnSpPr>
-          <p:nvPr/>
-        </p:nvCxnSpPr>
-        <p:spPr>
-          <a:xfrm flipH="1">
-            <a:off x="5588000" y="1694000"/>
-            <a:ext cx="4311650" cy="3147871"/>
-          </a:xfrm>
-          <a:prstGeom prst="straightConnector1">
-            <a:avLst/>
-          </a:prstGeom>
-          <a:ln w="9525">
-            <a:solidFill>
-              <a:schemeClr val="tx1"/>
-            </a:solidFill>
-            <a:tailEnd type="triangle"/>
-          </a:ln>
-        </p:spPr>
-        <p:style>
-          <a:lnRef idx="2">
-            <a:schemeClr val="accent1"/>
-          </a:lnRef>
-          <a:fillRef idx="0">
-            <a:schemeClr val="accent1"/>
-          </a:fillRef>
-          <a:effectRef idx="1">
-            <a:schemeClr val="accent1"/>
-          </a:effectRef>
-          <a:fontRef idx="minor">
-            <a:schemeClr val="tx1"/>
-          </a:fontRef>
-        </p:style>
-      </p:cxnSp>
-      <p:sp>
-        <p:nvSpPr>
-          <p:cNvPr id="46" name="Ellipse 45">
-            <a:extLst>
-              <a:ext uri="{FF2B5EF4-FFF2-40B4-BE49-F238E27FC236}">
-                <a16:creationId xmlns:a16="http://schemas.microsoft.com/office/drawing/2014/main" id="{0CADC8EB-6E50-92F9-E31E-4BD23E679DAA}"/>
-              </a:ext>
-            </a:extLst>
-          </p:cNvPr>
-          <p:cNvSpPr/>
-          <p:nvPr/>
-        </p:nvSpPr>
-        <p:spPr>
-          <a:xfrm>
-            <a:off x="4479877" y="2844665"/>
-            <a:ext cx="693242" cy="577602"/>
-          </a:xfrm>
-          <a:prstGeom prst="ellipse">
-            <a:avLst/>
-          </a:prstGeom>
-          <a:noFill/>
-          <a:ln w="9525">
-            <a:solidFill>
-              <a:schemeClr val="tx1"/>
-            </a:solidFill>
-            <a:prstDash val="dash"/>
-          </a:ln>
-        </p:spPr>
-        <p:style>
-          <a:lnRef idx="2">
-            <a:schemeClr val="accent1">
-              <a:shade val="15000"/>
-            </a:schemeClr>
-          </a:lnRef>
-          <a:fillRef idx="1">
-            <a:schemeClr val="accent1"/>
-          </a:fillRef>
-          <a:effectRef idx="0">
-            <a:schemeClr val="accent1"/>
-          </a:effectRef>
-          <a:fontRef idx="minor">
-            <a:schemeClr val="lt1"/>
-          </a:fontRef>
-        </p:style>
-        <p:txBody>
-          <a:bodyPr rtlCol="0" anchor="ctr"/>
-          <a:lstStyle/>
-          <a:p>
-            <a:pPr algn="ctr"/>
-            <a:r>
-              <a:rPr lang="fr-FR" dirty="0">
-                <a:solidFill>
-                  <a:schemeClr val="tx1"/>
-                </a:solidFill>
-              </a:rPr>
-              <a:t>Z</a:t>
-            </a:r>
-          </a:p>
-        </p:txBody>
-      </p:sp>
-      <mc:AlternateContent xmlns:mc="http://schemas.openxmlformats.org/markup-compatibility/2006">
-        <mc:Choice xmlns:a14="http://schemas.microsoft.com/office/drawing/2010/main" Requires="a14">
-          <p:sp>
-            <p:nvSpPr>
-              <p:cNvPr id="48" name="ZoneTexte 47">
-                <a:extLst>
-                  <a:ext uri="{FF2B5EF4-FFF2-40B4-BE49-F238E27FC236}">
-                    <a16:creationId xmlns:a16="http://schemas.microsoft.com/office/drawing/2014/main" id="{3F8AFB7B-81DC-79EA-3A9F-20855899EE1F}"/>
-                  </a:ext>
-                </a:extLst>
-              </p:cNvPr>
-              <p:cNvSpPr txBox="1"/>
-              <p:nvPr/>
-            </p:nvSpPr>
-            <p:spPr>
-              <a:xfrm>
-                <a:off x="4737623" y="1273868"/>
-                <a:ext cx="1421358" cy="506870"/>
-              </a:xfrm>
-              <a:prstGeom prst="rect">
-                <a:avLst/>
-              </a:prstGeom>
-              <a:noFill/>
-            </p:spPr>
-            <p:txBody>
-              <a:bodyPr wrap="square">
-                <a:spAutoFit/>
-              </a:bodyPr>
-              <a:lstStyle/>
-              <a:p>
-                <a:pPr/>
-                <a14:m>
-                  <m:oMathPara xmlns:m="http://schemas.openxmlformats.org/officeDocument/2006/math">
-                    <m:oMathParaPr>
-                      <m:jc m:val="centerGroup"/>
-                    </m:oMathParaPr>
-                    <m:oMath xmlns:m="http://schemas.openxmlformats.org/officeDocument/2006/math">
-                      <m:d>
-                        <m:dPr>
-                          <m:sepChr m:val=","/>
-                          <m:ctrlPr>
-                            <a:rPr lang="fr-FR" i="1" smtClean="0">
-                              <a:latin typeface="Cambria Math" panose="02040503050406030204" pitchFamily="18" charset="0"/>
-                            </a:rPr>
-                          </m:ctrlPr>
-                        </m:dPr>
-                        <m:e>
-                          <m:sSup>
-                            <m:sSupPr>
-                              <m:ctrlPr>
-                                <a:rPr lang="fr-FR" i="1">
-                                  <a:latin typeface="Cambria Math" panose="02040503050406030204" pitchFamily="18" charset="0"/>
-                                </a:rPr>
-                              </m:ctrlPr>
-                            </m:sSupPr>
-                            <m:e>
-                              <m:r>
-                                <a:rPr lang="fr-FR" i="1">
-                                  <a:latin typeface="Cambria Math" panose="02040503050406030204" pitchFamily="18" charset="0"/>
-                                </a:rPr>
-                                <m:t>𝜌</m:t>
-                              </m:r>
-                            </m:e>
-                            <m:sup>
-                              <m:r>
-                                <m:rPr>
-                                  <m:nor/>
-                                </m:rPr>
-                                <a:rPr lang="fr-FR" b="0" i="1">
-                                  <a:latin typeface="Cambria Math" panose="02040503050406030204" pitchFamily="18" charset="0"/>
-                                </a:rPr>
-                                <m:t>rk</m:t>
-                              </m:r>
-                            </m:sup>
-                          </m:sSup>
-                        </m:e>
-                        <m:e>
-                          <m:sSup>
-                            <m:sSupPr>
-                              <m:ctrlPr>
-                                <a:rPr lang="fr-FR" b="0" i="1">
-                                  <a:latin typeface="Cambria Math" panose="02040503050406030204" pitchFamily="18" charset="0"/>
-                                </a:rPr>
-                              </m:ctrlPr>
-                            </m:sSupPr>
-                            <m:e>
-                              <m:r>
-                                <a:rPr lang="fr-FR" b="0" i="1">
-                                  <a:latin typeface="Cambria Math" panose="02040503050406030204" pitchFamily="18" charset="0"/>
-                                </a:rPr>
-                                <m:t>𝜎</m:t>
-                              </m:r>
-                            </m:e>
-                            <m:sup>
-                              <m:r>
-                                <m:rPr>
-                                  <m:nor/>
-                                </m:rPr>
-                                <a:rPr lang="fr-FR" b="0" i="1">
-                                  <a:latin typeface="Cambria Math" panose="02040503050406030204" pitchFamily="18" charset="0"/>
-                                </a:rPr>
-                                <m:t>rk</m:t>
-                              </m:r>
-                            </m:sup>
-                          </m:sSup>
-                        </m:e>
-                      </m:d>
-                    </m:oMath>
-                  </m:oMathPara>
-                </a14:m>
-                <a:endParaRPr lang="fr-FR" dirty="0"/>
-              </a:p>
-            </p:txBody>
-          </p:sp>
-        </mc:Choice>
-        <mc:Fallback>
-          <p:sp>
-            <p:nvSpPr>
-              <p:cNvPr id="48" name="ZoneTexte 47">
-                <a:extLst>
-                  <a:ext uri="{FF2B5EF4-FFF2-40B4-BE49-F238E27FC236}">
-                    <a16:creationId xmlns:a16="http://schemas.microsoft.com/office/drawing/2014/main" id="{3F8AFB7B-81DC-79EA-3A9F-20855899EE1F}"/>
-                  </a:ext>
-                </a:extLst>
-              </p:cNvPr>
-              <p:cNvSpPr txBox="1">
-                <a:spLocks noRot="1" noChangeAspect="1" noMove="1" noResize="1" noEditPoints="1" noAdjustHandles="1" noChangeArrowheads="1" noChangeShapeType="1" noTextEdit="1"/>
-              </p:cNvSpPr>
-              <p:nvPr/>
-            </p:nvSpPr>
-            <p:spPr>
-              <a:xfrm>
-                <a:off x="4737623" y="1273868"/>
-                <a:ext cx="1421358" cy="506870"/>
+                <a:off x="6753369" y="4128239"/>
+                <a:ext cx="2413000" cy="307777"/>
               </a:xfrm>
               <a:prstGeom prst="rect">
                 <a:avLst/>
@@ -11928,58 +12157,449 @@
           </p:sp>
         </mc:Fallback>
       </mc:AlternateContent>
-      <p:cxnSp>
-        <p:nvCxnSpPr>
-          <p:cNvPr id="54" name="Connecteur droit avec flèche 53">
-            <a:extLst>
-              <a:ext uri="{FF2B5EF4-FFF2-40B4-BE49-F238E27FC236}">
-                <a16:creationId xmlns:a16="http://schemas.microsoft.com/office/drawing/2014/main" id="{BDFA93E3-64BD-5833-5C54-F1CE783B2C9B}"/>
-              </a:ext>
-            </a:extLst>
-          </p:cNvPr>
-          <p:cNvCxnSpPr>
-            <a:cxnSpLocks/>
-          </p:cNvCxnSpPr>
+      <p:grpSp>
+        <p:nvGrpSpPr>
+          <p:cNvPr id="99" name="Groupe 98">
+            <a:extLst>
+              <a:ext uri="{FF2B5EF4-FFF2-40B4-BE49-F238E27FC236}">
+                <a16:creationId xmlns:a16="http://schemas.microsoft.com/office/drawing/2014/main" id="{F80F631D-2606-1EF6-ADC4-1FE100FEE87F}"/>
+              </a:ext>
+            </a:extLst>
+          </p:cNvPr>
+          <p:cNvGrpSpPr/>
           <p:nvPr/>
-        </p:nvCxnSpPr>
-        <p:spPr>
-          <a:xfrm flipH="1">
-            <a:off x="4390138" y="3552145"/>
-            <a:ext cx="305639" cy="644339"/>
-          </a:xfrm>
-          <a:prstGeom prst="straightConnector1">
+        </p:nvGrpSpPr>
+        <p:grpSpPr>
+          <a:xfrm>
+            <a:off x="6753369" y="1663239"/>
+            <a:ext cx="2704129" cy="1232043"/>
+            <a:chOff x="5751745" y="1818153"/>
+            <a:chExt cx="2704129" cy="1232043"/>
+          </a:xfrm>
+        </p:grpSpPr>
+        <p:sp>
+          <p:nvSpPr>
+            <p:cNvPr id="84" name="Ellipse 83">
+              <a:extLst>
+                <a:ext uri="{FF2B5EF4-FFF2-40B4-BE49-F238E27FC236}">
+                  <a16:creationId xmlns:a16="http://schemas.microsoft.com/office/drawing/2014/main" id="{F814F16C-3C12-6DAD-E4DC-FE867C916C0E}"/>
+                </a:ext>
+              </a:extLst>
+            </p:cNvPr>
+            <p:cNvSpPr/>
+            <p:nvPr/>
+          </p:nvSpPr>
+          <p:spPr>
+            <a:xfrm>
+              <a:off x="5769430" y="1818153"/>
+              <a:ext cx="2686444" cy="1232043"/>
+            </a:xfrm>
+            <a:prstGeom prst="ellipse">
+              <a:avLst/>
+            </a:prstGeom>
+            <a:solidFill>
+              <a:srgbClr val="E2DFE3"/>
+            </a:solidFill>
+          </p:spPr>
+          <p:style>
+            <a:lnRef idx="2">
+              <a:schemeClr val="accent1">
+                <a:shade val="15000"/>
+              </a:schemeClr>
+            </a:lnRef>
+            <a:fillRef idx="1">
+              <a:schemeClr val="accent1"/>
+            </a:fillRef>
+            <a:effectRef idx="0">
+              <a:schemeClr val="accent1"/>
+            </a:effectRef>
+            <a:fontRef idx="minor">
+              <a:schemeClr val="lt1"/>
+            </a:fontRef>
+          </p:style>
+          <p:txBody>
+            <a:bodyPr rtlCol="0" anchor="t"/>
+            <a:lstStyle/>
+            <a:p>
+              <a:pPr algn="ctr"/>
+              <a:r>
+                <a:rPr lang="fr-FR" b="1" dirty="0" err="1">
+                  <a:solidFill>
+                    <a:schemeClr val="tx1"/>
+                  </a:solidFill>
+                </a:rPr>
+                <a:t>Exposure</a:t>
+              </a:r>
+              <a:r>
+                <a:rPr lang="fr-FR" b="1" dirty="0">
+                  <a:solidFill>
+                    <a:schemeClr val="tx1"/>
+                  </a:solidFill>
+                </a:rPr>
+                <a:t> model</a:t>
+              </a:r>
+            </a:p>
+          </p:txBody>
+        </p:sp>
+        <mc:AlternateContent xmlns:mc="http://schemas.openxmlformats.org/markup-compatibility/2006">
+          <mc:Choice xmlns:a14="http://schemas.microsoft.com/office/drawing/2010/main" Requires="a14">
+            <p:sp>
+              <p:nvSpPr>
+                <p:cNvPr id="61" name="ZoneTexte 60">
+                  <a:extLst>
+                    <a:ext uri="{FF2B5EF4-FFF2-40B4-BE49-F238E27FC236}">
+                      <a16:creationId xmlns:a16="http://schemas.microsoft.com/office/drawing/2014/main" id="{88126D96-3622-FF73-1E99-6A1E54EDFE55}"/>
+                    </a:ext>
+                  </a:extLst>
+                </p:cNvPr>
+                <p:cNvSpPr txBox="1"/>
+                <p:nvPr/>
+              </p:nvSpPr>
+              <p:spPr>
+                <a:xfrm>
+                  <a:off x="5751745" y="2263634"/>
+                  <a:ext cx="2654217" cy="697114"/>
+                </a:xfrm>
+                <a:prstGeom prst="rect">
+                  <a:avLst/>
+                </a:prstGeom>
+                <a:noFill/>
+              </p:spPr>
+              <p:txBody>
+                <a:bodyPr wrap="square">
+                  <a:spAutoFit/>
+                </a:bodyPr>
+                <a:lstStyle/>
+                <a:p>
+                  <a:pPr/>
+                  <a14:m>
+                    <m:oMathPara xmlns:m="http://schemas.openxmlformats.org/officeDocument/2006/math">
+                      <m:oMathParaPr>
+                        <m:jc m:val="centerGroup"/>
+                      </m:oMathParaPr>
+                      <m:oMath xmlns:m="http://schemas.openxmlformats.org/officeDocument/2006/math">
+                        <m:sSub>
+                          <m:sSubPr>
+                            <m:ctrlPr>
+                              <a:rPr lang="fr-FR" sz="1400" i="1" smtClean="0">
+                                <a:latin typeface="Cambria Math" panose="02040503050406030204" pitchFamily="18" charset="0"/>
+                              </a:rPr>
+                            </m:ctrlPr>
+                          </m:sSubPr>
+                          <m:e>
+                            <m:r>
+                              <a:rPr lang="fr-FR" sz="1400" i="1">
+                                <a:latin typeface="Cambria Math" panose="02040503050406030204" pitchFamily="18" charset="0"/>
+                              </a:rPr>
+                              <m:t>𝛽</m:t>
+                            </m:r>
+                          </m:e>
+                          <m:sub>
+                            <m:r>
+                              <a:rPr lang="fr-FR" sz="1400" i="0">
+                                <a:latin typeface="Cambria Math" panose="02040503050406030204" pitchFamily="18" charset="0"/>
+                              </a:rPr>
+                              <m:t>0</m:t>
+                            </m:r>
+                          </m:sub>
+                        </m:sSub>
+                        <m:r>
+                          <a:rPr lang="fr-FR" sz="1400" i="0">
+                            <a:latin typeface="Cambria Math" panose="02040503050406030204" pitchFamily="18" charset="0"/>
+                          </a:rPr>
+                          <m:t>+</m:t>
+                        </m:r>
+                        <m:nary>
+                          <m:naryPr>
+                            <m:chr m:val="∑"/>
+                            <m:limLoc m:val="undOvr"/>
+                            <m:ctrlPr>
+                              <a:rPr lang="fr-FR" sz="1400" i="1">
+                                <a:latin typeface="Cambria Math" panose="02040503050406030204" pitchFamily="18" charset="0"/>
+                              </a:rPr>
+                            </m:ctrlPr>
+                          </m:naryPr>
+                          <m:sub>
+                            <m:r>
+                              <a:rPr lang="fr-FR" sz="1400" i="1">
+                                <a:latin typeface="Cambria Math" panose="02040503050406030204" pitchFamily="18" charset="0"/>
+                              </a:rPr>
+                              <m:t>𝑘</m:t>
+                            </m:r>
+                            <m:r>
+                              <a:rPr lang="fr-FR" sz="1400" i="0">
+                                <a:latin typeface="Cambria Math" panose="02040503050406030204" pitchFamily="18" charset="0"/>
+                              </a:rPr>
+                              <m:t>=1</m:t>
+                            </m:r>
+                          </m:sub>
+                          <m:sup>
+                            <m:r>
+                              <a:rPr lang="fr-FR" sz="1400" i="0">
+                                <a:latin typeface="Cambria Math" panose="02040503050406030204" pitchFamily="18" charset="0"/>
+                              </a:rPr>
+                              <m:t>4</m:t>
+                            </m:r>
+                          </m:sup>
+                          <m:e>
+                            <m:sSub>
+                              <m:sSubPr>
+                                <m:ctrlPr>
+                                  <a:rPr lang="fr-FR" sz="1400" i="1">
+                                    <a:latin typeface="Cambria Math" panose="02040503050406030204" pitchFamily="18" charset="0"/>
+                                  </a:rPr>
+                                </m:ctrlPr>
+                              </m:sSubPr>
+                              <m:e>
+                                <m:r>
+                                  <a:rPr lang="fr-FR" sz="1400" i="1">
+                                    <a:latin typeface="Cambria Math" panose="02040503050406030204" pitchFamily="18" charset="0"/>
+                                  </a:rPr>
+                                  <m:t>𝛽</m:t>
+                                </m:r>
+                              </m:e>
+                              <m:sub>
+                                <m:r>
+                                  <a:rPr lang="fr-FR" sz="1400" i="1">
+                                    <a:latin typeface="Cambria Math" panose="02040503050406030204" pitchFamily="18" charset="0"/>
+                                  </a:rPr>
+                                  <m:t>𝑘</m:t>
+                                </m:r>
+                              </m:sub>
+                            </m:sSub>
+                            <m:sSub>
+                              <m:sSubPr>
+                                <m:ctrlPr>
+                                  <a:rPr lang="fr-FR" sz="1400" i="1">
+                                    <a:latin typeface="Cambria Math" panose="02040503050406030204" pitchFamily="18" charset="0"/>
+                                  </a:rPr>
+                                </m:ctrlPr>
+                              </m:sSubPr>
+                              <m:e>
+                                <m:r>
+                                  <m:rPr>
+                                    <m:nor/>
+                                  </m:rPr>
+                                  <a:rPr lang="fr-FR" sz="1400" b="0" i="1">
+                                    <a:latin typeface="Cambria Math" panose="02040503050406030204" pitchFamily="18" charset="0"/>
+                                  </a:rPr>
+                                  <m:t>COV</m:t>
+                                </m:r>
+                              </m:e>
+                              <m:sub>
+                                <m:r>
+                                  <a:rPr lang="fr-FR" sz="1400" b="0" i="1">
+                                    <a:latin typeface="Cambria Math" panose="02040503050406030204" pitchFamily="18" charset="0"/>
+                                  </a:rPr>
+                                  <m:t>𝑘</m:t>
+                                </m:r>
+                              </m:sub>
+                            </m:sSub>
+                            <m:d>
+                              <m:dPr>
+                                <m:ctrlPr>
+                                  <a:rPr lang="fr-FR" sz="1400" b="0" i="1">
+                                    <a:latin typeface="Cambria Math" panose="02040503050406030204" pitchFamily="18" charset="0"/>
+                                  </a:rPr>
+                                </m:ctrlPr>
+                              </m:dPr>
+                              <m:e>
+                                <m:r>
+                                  <a:rPr lang="fr-FR" sz="1400" b="0" i="1">
+                                    <a:latin typeface="Cambria Math" panose="02040503050406030204" pitchFamily="18" charset="0"/>
+                                  </a:rPr>
+                                  <m:t>𝑠</m:t>
+                                </m:r>
+                              </m:e>
+                            </m:d>
+                          </m:e>
+                        </m:nary>
+                      </m:oMath>
+                    </m:oMathPara>
+                  </a14:m>
+                  <a:endParaRPr lang="fr-FR" sz="1400" dirty="0"/>
+                </a:p>
+              </p:txBody>
+            </p:sp>
+          </mc:Choice>
+          <mc:Fallback>
+            <p:sp>
+              <p:nvSpPr>
+                <p:cNvPr id="61" name="ZoneTexte 60">
+                  <a:extLst>
+                    <a:ext uri="{FF2B5EF4-FFF2-40B4-BE49-F238E27FC236}">
+                      <a16:creationId xmlns:a16="http://schemas.microsoft.com/office/drawing/2014/main" id="{88126D96-3622-FF73-1E99-6A1E54EDFE55}"/>
+                    </a:ext>
+                  </a:extLst>
+                </p:cNvPr>
+                <p:cNvSpPr txBox="1">
+                  <a:spLocks noRot="1" noChangeAspect="1" noMove="1" noResize="1" noEditPoints="1" noAdjustHandles="1" noChangeArrowheads="1" noChangeShapeType="1" noTextEdit="1"/>
+                </p:cNvSpPr>
+                <p:nvPr/>
+              </p:nvSpPr>
+              <p:spPr>
+                <a:xfrm>
+                  <a:off x="5751745" y="2263634"/>
+                  <a:ext cx="2654217" cy="697114"/>
+                </a:xfrm>
+                <a:prstGeom prst="rect">
+                  <a:avLst/>
+                </a:prstGeom>
+                <a:blipFill>
+                  <a:blip r:embed="rId10"/>
+                  <a:stretch>
+                    <a:fillRect/>
+                  </a:stretch>
+                </a:blipFill>
+              </p:spPr>
+              <p:txBody>
+                <a:bodyPr/>
+                <a:lstStyle/>
+                <a:p>
+                  <a:r>
+                    <a:rPr lang="fr-FR">
+                      <a:noFill/>
+                    </a:rPr>
+                    <a:t> </a:t>
+                  </a:r>
+                </a:p>
+              </p:txBody>
+            </p:sp>
+          </mc:Fallback>
+        </mc:AlternateContent>
+      </p:grpSp>
+      <p:sp>
+        <p:nvSpPr>
+          <p:cNvPr id="89" name="Ellipse 88">
+            <a:extLst>
+              <a:ext uri="{FF2B5EF4-FFF2-40B4-BE49-F238E27FC236}">
+                <a16:creationId xmlns:a16="http://schemas.microsoft.com/office/drawing/2014/main" id="{2CDCDDEB-2390-00C5-9403-A4BD15801BE1}"/>
+              </a:ext>
+            </a:extLst>
+          </p:cNvPr>
+          <p:cNvSpPr/>
+          <p:nvPr/>
+        </p:nvSpPr>
+        <p:spPr>
+          <a:xfrm>
+            <a:off x="3770363" y="1072107"/>
+            <a:ext cx="693242" cy="577602"/>
+          </a:xfrm>
+          <a:prstGeom prst="ellipse">
             <a:avLst/>
           </a:prstGeom>
+          <a:solidFill>
+            <a:schemeClr val="bg1"/>
+          </a:solidFill>
           <a:ln w="9525">
             <a:solidFill>
               <a:schemeClr val="tx1"/>
             </a:solidFill>
-            <a:tailEnd type="triangle"/>
+            <a:prstDash val="dash"/>
           </a:ln>
         </p:spPr>
         <p:style>
           <a:lnRef idx="2">
-            <a:schemeClr val="accent1"/>
+            <a:schemeClr val="accent1">
+              <a:shade val="15000"/>
+            </a:schemeClr>
           </a:lnRef>
-          <a:fillRef idx="0">
+          <a:fillRef idx="1">
             <a:schemeClr val="accent1"/>
           </a:fillRef>
-          <a:effectRef idx="1">
+          <a:effectRef idx="0">
             <a:schemeClr val="accent1"/>
           </a:effectRef>
           <a:fontRef idx="minor">
-            <a:schemeClr val="tx1"/>
+            <a:schemeClr val="lt1"/>
           </a:fontRef>
         </p:style>
-      </p:cxnSp>
+        <p:txBody>
+          <a:bodyPr rtlCol="0" anchor="ctr"/>
+          <a:lstStyle/>
+          <a:p>
+            <a:pPr algn="ctr"/>
+            <a:r>
+              <a:rPr lang="fr-FR" sz="1400" dirty="0">
+                <a:solidFill>
+                  <a:schemeClr val="tx1"/>
+                </a:solidFill>
+              </a:rPr>
+              <a:t>W</a:t>
+            </a:r>
+          </a:p>
+        </p:txBody>
+      </p:sp>
+      <p:sp>
+        <p:nvSpPr>
+          <p:cNvPr id="90" name="Ellipse 89">
+            <a:extLst>
+              <a:ext uri="{FF2B5EF4-FFF2-40B4-BE49-F238E27FC236}">
+                <a16:creationId xmlns:a16="http://schemas.microsoft.com/office/drawing/2014/main" id="{4926B57C-B925-93E6-81F1-3A467513C88B}"/>
+              </a:ext>
+            </a:extLst>
+          </p:cNvPr>
+          <p:cNvSpPr/>
+          <p:nvPr/>
+        </p:nvSpPr>
+        <p:spPr>
+          <a:xfrm>
+            <a:off x="4762725" y="1085637"/>
+            <a:ext cx="693242" cy="577602"/>
+          </a:xfrm>
+          <a:prstGeom prst="ellipse">
+            <a:avLst/>
+          </a:prstGeom>
+          <a:solidFill>
+            <a:schemeClr val="bg1"/>
+          </a:solidFill>
+          <a:ln w="9525">
+            <a:solidFill>
+              <a:schemeClr val="tx1"/>
+            </a:solidFill>
+            <a:prstDash val="dash"/>
+          </a:ln>
+        </p:spPr>
+        <p:style>
+          <a:lnRef idx="2">
+            <a:schemeClr val="accent1">
+              <a:shade val="15000"/>
+            </a:schemeClr>
+          </a:lnRef>
+          <a:fillRef idx="1">
+            <a:schemeClr val="accent1"/>
+          </a:fillRef>
+          <a:effectRef idx="0">
+            <a:schemeClr val="accent1"/>
+          </a:effectRef>
+          <a:fontRef idx="minor">
+            <a:schemeClr val="lt1"/>
+          </a:fontRef>
+        </p:style>
+        <p:txBody>
+          <a:bodyPr rtlCol="0" anchor="ctr"/>
+          <a:lstStyle/>
+          <a:p>
+            <a:pPr algn="ctr"/>
+            <a:r>
+              <a:rPr lang="fr-FR" sz="1400" dirty="0">
+                <a:solidFill>
+                  <a:schemeClr val="tx1"/>
+                </a:solidFill>
+              </a:rPr>
+              <a:t>Z</a:t>
+            </a:r>
+          </a:p>
+        </p:txBody>
+      </p:sp>
       <mc:AlternateContent xmlns:mc="http://schemas.openxmlformats.org/markup-compatibility/2006">
         <mc:Choice xmlns:a14="http://schemas.microsoft.com/office/drawing/2010/main" Requires="a14">
           <p:sp>
             <p:nvSpPr>
-              <p:cNvPr id="61" name="ZoneTexte 60">
+              <p:cNvPr id="91" name="ZoneTexte 90">
                 <a:extLst>
                   <a:ext uri="{FF2B5EF4-FFF2-40B4-BE49-F238E27FC236}">
-                    <a16:creationId xmlns:a16="http://schemas.microsoft.com/office/drawing/2014/main" id="{88126D96-3622-FF73-1E99-6A1E54EDFE55}"/>
+                    <a16:creationId xmlns:a16="http://schemas.microsoft.com/office/drawing/2014/main" id="{AFE82C61-4576-3B0D-27AD-92FA3828D3D0}"/>
                   </a:ext>
                 </a:extLst>
               </p:cNvPr>
@@ -11988,8 +12608,8 @@
             </p:nvSpPr>
             <p:spPr>
               <a:xfrm>
-                <a:off x="6385507" y="1059153"/>
-                <a:ext cx="2654217" cy="869918"/>
+                <a:off x="5953894" y="1205839"/>
+                <a:ext cx="1421358" cy="414729"/>
               </a:xfrm>
               <a:prstGeom prst="rect">
                 <a:avLst/>
@@ -12009,146 +12629,80 @@
                       <m:jc m:val="centerGroup"/>
                     </m:oMathParaPr>
                     <m:oMath xmlns:m="http://schemas.openxmlformats.org/officeDocument/2006/math">
-                      <m:sSub>
-                        <m:sSubPr>
+                      <m:d>
+                        <m:dPr>
+                          <m:sepChr m:val=","/>
                           <m:ctrlPr>
-                            <a:rPr lang="fr-FR" i="1" smtClean="0">
+                            <a:rPr lang="fr-FR" sz="1400" i="1" smtClean="0">
                               <a:latin typeface="Cambria Math" panose="02040503050406030204" pitchFamily="18" charset="0"/>
                             </a:rPr>
                           </m:ctrlPr>
-                        </m:sSubPr>
+                        </m:dPr>
                         <m:e>
-                          <m:r>
-                            <a:rPr lang="fr-FR" i="1">
-                              <a:latin typeface="Cambria Math" panose="02040503050406030204" pitchFamily="18" charset="0"/>
-                            </a:rPr>
-                            <m:t>𝛽</m:t>
-                          </m:r>
-                        </m:e>
-                        <m:sub>
-                          <m:r>
-                            <a:rPr lang="fr-FR" i="0">
-                              <a:latin typeface="Cambria Math" panose="02040503050406030204" pitchFamily="18" charset="0"/>
-                            </a:rPr>
-                            <m:t>0</m:t>
-                          </m:r>
-                        </m:sub>
-                      </m:sSub>
-                      <m:r>
-                        <a:rPr lang="fr-FR" i="0">
-                          <a:latin typeface="Cambria Math" panose="02040503050406030204" pitchFamily="18" charset="0"/>
-                        </a:rPr>
-                        <m:t>+</m:t>
-                      </m:r>
-                      <m:nary>
-                        <m:naryPr>
-                          <m:chr m:val="∑"/>
-                          <m:limLoc m:val="undOvr"/>
-                          <m:ctrlPr>
-                            <a:rPr lang="fr-FR" i="1">
-                              <a:latin typeface="Cambria Math" panose="02040503050406030204" pitchFamily="18" charset="0"/>
-                            </a:rPr>
-                          </m:ctrlPr>
-                        </m:naryPr>
-                        <m:sub>
-                          <m:r>
-                            <a:rPr lang="fr-FR" i="1">
-                              <a:latin typeface="Cambria Math" panose="02040503050406030204" pitchFamily="18" charset="0"/>
-                            </a:rPr>
-                            <m:t>𝑘</m:t>
-                          </m:r>
-                          <m:r>
-                            <a:rPr lang="fr-FR" i="0">
-                              <a:latin typeface="Cambria Math" panose="02040503050406030204" pitchFamily="18" charset="0"/>
-                            </a:rPr>
-                            <m:t>=1</m:t>
-                          </m:r>
-                        </m:sub>
-                        <m:sup>
-                          <m:r>
-                            <a:rPr lang="fr-FR" i="0">
-                              <a:latin typeface="Cambria Math" panose="02040503050406030204" pitchFamily="18" charset="0"/>
-                            </a:rPr>
-                            <m:t>4</m:t>
-                          </m:r>
-                        </m:sup>
-                        <m:e>
-                          <m:sSub>
-                            <m:sSubPr>
+                          <m:sSup>
+                            <m:sSupPr>
                               <m:ctrlPr>
-                                <a:rPr lang="fr-FR" i="1">
+                                <a:rPr lang="fr-FR" sz="1400" i="1">
                                   <a:latin typeface="Cambria Math" panose="02040503050406030204" pitchFamily="18" charset="0"/>
                                 </a:rPr>
                               </m:ctrlPr>
-                            </m:sSubPr>
+                            </m:sSupPr>
                             <m:e>
                               <m:r>
-                                <a:rPr lang="fr-FR" i="1">
+                                <a:rPr lang="fr-FR" sz="1400" i="1">
                                   <a:latin typeface="Cambria Math" panose="02040503050406030204" pitchFamily="18" charset="0"/>
                                 </a:rPr>
-                                <m:t>𝛽</m:t>
+                                <m:t>𝜌</m:t>
                               </m:r>
                             </m:e>
-                            <m:sub>
-                              <m:r>
-                                <a:rPr lang="fr-FR" i="1">
-                                  <a:latin typeface="Cambria Math" panose="02040503050406030204" pitchFamily="18" charset="0"/>
-                                </a:rPr>
-                                <m:t>𝑘</m:t>
-                              </m:r>
-                            </m:sub>
-                          </m:sSub>
-                          <m:sSub>
-                            <m:sSubPr>
-                              <m:ctrlPr>
-                                <a:rPr lang="fr-FR" i="1">
-                                  <a:latin typeface="Cambria Math" panose="02040503050406030204" pitchFamily="18" charset="0"/>
-                                </a:rPr>
-                              </m:ctrlPr>
-                            </m:sSubPr>
-                            <m:e>
+                            <m:sup>
                               <m:r>
                                 <m:rPr>
                                   <m:nor/>
                                 </m:rPr>
-                                <a:rPr lang="fr-FR" b="0" i="1">
+                                <a:rPr lang="fr-FR" sz="1400" b="0" i="1">
                                   <a:latin typeface="Cambria Math" panose="02040503050406030204" pitchFamily="18" charset="0"/>
                                 </a:rPr>
-                                <m:t>COV</m:t>
+                                <m:t>rk</m:t>
                               </m:r>
-                            </m:e>
-                            <m:sub>
-                              <m:r>
-                                <a:rPr lang="fr-FR" b="0" i="1">
-                                  <a:latin typeface="Cambria Math" panose="02040503050406030204" pitchFamily="18" charset="0"/>
-                                </a:rPr>
-                                <m:t>𝑘</m:t>
-                              </m:r>
-                            </m:sub>
-                          </m:sSub>
-                          <m:d>
-                            <m:dPr>
+                            </m:sup>
+                          </m:sSup>
+                        </m:e>
+                        <m:e>
+                          <m:sSup>
+                            <m:sSupPr>
                               <m:ctrlPr>
-                                <a:rPr lang="fr-FR" b="0" i="1">
+                                <a:rPr lang="fr-FR" sz="1400" b="0" i="1">
                                   <a:latin typeface="Cambria Math" panose="02040503050406030204" pitchFamily="18" charset="0"/>
                                 </a:rPr>
                               </m:ctrlPr>
-                            </m:dPr>
+                            </m:sSupPr>
                             <m:e>
                               <m:r>
-                                <a:rPr lang="fr-FR" b="0" i="1">
+                                <a:rPr lang="fr-FR" sz="1400" b="0" i="1">
                                   <a:latin typeface="Cambria Math" panose="02040503050406030204" pitchFamily="18" charset="0"/>
                                 </a:rPr>
-                                <m:t>𝑠</m:t>
+                                <m:t>𝜎</m:t>
                               </m:r>
                             </m:e>
-                          </m:d>
+                            <m:sup>
+                              <m:r>
+                                <m:rPr>
+                                  <m:nor/>
+                                </m:rPr>
+                                <a:rPr lang="fr-FR" sz="1400" b="0" i="1">
+                                  <a:latin typeface="Cambria Math" panose="02040503050406030204" pitchFamily="18" charset="0"/>
+                                </a:rPr>
+                                <m:t>rk</m:t>
+                              </m:r>
+                            </m:sup>
+                          </m:sSup>
                         </m:e>
-                      </m:nary>
+                      </m:d>
                     </m:oMath>
                   </m:oMathPara>
                 </a14:m>
-                <a:endParaRPr lang="fr-FR" dirty="0"/>
+                <a:endParaRPr lang="fr-FR" sz="1400" dirty="0"/>
               </a:p>
             </p:txBody>
           </p:sp>
@@ -12156,10 +12710,10 @@
         <mc:Fallback>
           <p:sp>
             <p:nvSpPr>
-              <p:cNvPr id="61" name="ZoneTexte 60">
+              <p:cNvPr id="91" name="ZoneTexte 90">
                 <a:extLst>
                   <a:ext uri="{FF2B5EF4-FFF2-40B4-BE49-F238E27FC236}">
-                    <a16:creationId xmlns:a16="http://schemas.microsoft.com/office/drawing/2014/main" id="{88126D96-3622-FF73-1E99-6A1E54EDFE55}"/>
+                    <a16:creationId xmlns:a16="http://schemas.microsoft.com/office/drawing/2014/main" id="{AFE82C61-4576-3B0D-27AD-92FA3828D3D0}"/>
                   </a:ext>
                 </a:extLst>
               </p:cNvPr>
@@ -12170,14 +12724,174 @@
             </p:nvSpPr>
             <p:spPr>
               <a:xfrm>
-                <a:off x="6385507" y="1059153"/>
-                <a:ext cx="2654217" cy="869918"/>
+                <a:off x="5953894" y="1205839"/>
+                <a:ext cx="1421358" cy="414729"/>
               </a:xfrm>
               <a:prstGeom prst="rect">
                 <a:avLst/>
               </a:prstGeom>
               <a:blipFill>
-                <a:blip r:embed="rId10"/>
+                <a:blip r:embed="rId11"/>
+                <a:stretch>
+                  <a:fillRect/>
+                </a:stretch>
+              </a:blipFill>
+            </p:spPr>
+            <p:txBody>
+              <a:bodyPr/>
+              <a:lstStyle/>
+              <a:p>
+                <a:r>
+                  <a:rPr lang="fr-FR">
+                    <a:noFill/>
+                  </a:rPr>
+                  <a:t> </a:t>
+                </a:r>
+              </a:p>
+            </p:txBody>
+          </p:sp>
+        </mc:Fallback>
+      </mc:AlternateContent>
+      <mc:AlternateContent xmlns:mc="http://schemas.openxmlformats.org/markup-compatibility/2006">
+        <mc:Choice xmlns:a14="http://schemas.microsoft.com/office/drawing/2010/main" Requires="a14">
+          <p:sp>
+            <p:nvSpPr>
+              <p:cNvPr id="92" name="ZoneTexte 91">
+                <a:extLst>
+                  <a:ext uri="{FF2B5EF4-FFF2-40B4-BE49-F238E27FC236}">
+                    <a16:creationId xmlns:a16="http://schemas.microsoft.com/office/drawing/2014/main" id="{A9FA909D-6592-A6DC-CCCC-1A2DAE01027C}"/>
+                  </a:ext>
+                </a:extLst>
+              </p:cNvPr>
+              <p:cNvSpPr txBox="1"/>
+              <p:nvPr/>
+            </p:nvSpPr>
+            <p:spPr>
+              <a:xfrm>
+                <a:off x="1991588" y="1178982"/>
+                <a:ext cx="1206500" cy="414729"/>
+              </a:xfrm>
+              <a:prstGeom prst="rect">
+                <a:avLst/>
+              </a:prstGeom>
+              <a:noFill/>
+            </p:spPr>
+            <p:txBody>
+              <a:bodyPr wrap="square">
+                <a:spAutoFit/>
+              </a:bodyPr>
+              <a:lstStyle/>
+              <a:p>
+                <a:pPr/>
+                <a14:m>
+                  <m:oMathPara xmlns:m="http://schemas.openxmlformats.org/officeDocument/2006/math">
+                    <m:oMathParaPr>
+                      <m:jc m:val="centerGroup"/>
+                    </m:oMathParaPr>
+                    <m:oMath xmlns:m="http://schemas.openxmlformats.org/officeDocument/2006/math">
+                      <m:d>
+                        <m:dPr>
+                          <m:sepChr m:val=","/>
+                          <m:ctrlPr>
+                            <a:rPr lang="fr-FR" sz="1400" i="1" smtClean="0">
+                              <a:latin typeface="Cambria Math" panose="02040503050406030204" pitchFamily="18" charset="0"/>
+                            </a:rPr>
+                          </m:ctrlPr>
+                        </m:dPr>
+                        <m:e>
+                          <m:sSup>
+                            <m:sSupPr>
+                              <m:ctrlPr>
+                                <a:rPr lang="fr-FR" sz="1400" i="1">
+                                  <a:latin typeface="Cambria Math" panose="02040503050406030204" pitchFamily="18" charset="0"/>
+                                </a:rPr>
+                              </m:ctrlPr>
+                            </m:sSupPr>
+                            <m:e>
+                              <m:r>
+                                <a:rPr lang="fr-FR" sz="1400" i="1">
+                                  <a:latin typeface="Cambria Math" panose="02040503050406030204" pitchFamily="18" charset="0"/>
+                                </a:rPr>
+                                <m:t>𝜌</m:t>
+                              </m:r>
+                            </m:e>
+                            <m:sup>
+                              <m:r>
+                                <m:rPr>
+                                  <m:nor/>
+                                </m:rPr>
+                                <a:rPr lang="fr-FR" sz="1400" b="0" i="1">
+                                  <a:latin typeface="Cambria Math" panose="02040503050406030204" pitchFamily="18" charset="0"/>
+                                </a:rPr>
+                                <m:t>lv</m:t>
+                              </m:r>
+                            </m:sup>
+                          </m:sSup>
+                        </m:e>
+                        <m:e>
+                          <m:sSup>
+                            <m:sSupPr>
+                              <m:ctrlPr>
+                                <a:rPr lang="fr-FR" sz="1400" b="0" i="1">
+                                  <a:latin typeface="Cambria Math" panose="02040503050406030204" pitchFamily="18" charset="0"/>
+                                </a:rPr>
+                              </m:ctrlPr>
+                            </m:sSupPr>
+                            <m:e>
+                              <m:r>
+                                <a:rPr lang="fr-FR" sz="1400" b="0" i="1">
+                                  <a:latin typeface="Cambria Math" panose="02040503050406030204" pitchFamily="18" charset="0"/>
+                                </a:rPr>
+                                <m:t>𝜎</m:t>
+                              </m:r>
+                            </m:e>
+                            <m:sup>
+                              <m:r>
+                                <m:rPr>
+                                  <m:nor/>
+                                </m:rPr>
+                                <a:rPr lang="fr-FR" sz="1400" b="0" i="1">
+                                  <a:latin typeface="Cambria Math" panose="02040503050406030204" pitchFamily="18" charset="0"/>
+                                </a:rPr>
+                                <m:t>lv</m:t>
+                              </m:r>
+                            </m:sup>
+                          </m:sSup>
+                        </m:e>
+                      </m:d>
+                    </m:oMath>
+                  </m:oMathPara>
+                </a14:m>
+                <a:endParaRPr lang="fr-FR" sz="1400" dirty="0"/>
+              </a:p>
+            </p:txBody>
+          </p:sp>
+        </mc:Choice>
+        <mc:Fallback>
+          <p:sp>
+            <p:nvSpPr>
+              <p:cNvPr id="92" name="ZoneTexte 91">
+                <a:extLst>
+                  <a:ext uri="{FF2B5EF4-FFF2-40B4-BE49-F238E27FC236}">
+                    <a16:creationId xmlns:a16="http://schemas.microsoft.com/office/drawing/2014/main" id="{A9FA909D-6592-A6DC-CCCC-1A2DAE01027C}"/>
+                  </a:ext>
+                </a:extLst>
+              </p:cNvPr>
+              <p:cNvSpPr txBox="1">
+                <a:spLocks noRot="1" noChangeAspect="1" noMove="1" noResize="1" noEditPoints="1" noAdjustHandles="1" noChangeArrowheads="1" noChangeShapeType="1" noTextEdit="1"/>
+              </p:cNvSpPr>
+              <p:nvPr/>
+            </p:nvSpPr>
+            <p:spPr>
+              <a:xfrm>
+                <a:off x="1991588" y="1178982"/>
+                <a:ext cx="1206500" cy="414729"/>
+              </a:xfrm>
+              <a:prstGeom prst="rect">
+                <a:avLst/>
+              </a:prstGeom>
+              <a:blipFill>
+                <a:blip r:embed="rId12"/>
                 <a:stretch>
                   <a:fillRect/>
                 </a:stretch>
@@ -12200,23 +12914,23 @@
       </mc:AlternateContent>
       <p:cxnSp>
         <p:nvCxnSpPr>
-          <p:cNvPr id="63" name="Connecteur droit avec flèche 62">
-            <a:extLst>
-              <a:ext uri="{FF2B5EF4-FFF2-40B4-BE49-F238E27FC236}">
-                <a16:creationId xmlns:a16="http://schemas.microsoft.com/office/drawing/2014/main" id="{D6170C15-B143-25DE-B1B8-5A8AA2447481}"/>
+          <p:cNvPr id="95" name="Connecteur droit avec flèche 94">
+            <a:extLst>
+              <a:ext uri="{FF2B5EF4-FFF2-40B4-BE49-F238E27FC236}">
+                <a16:creationId xmlns:a16="http://schemas.microsoft.com/office/drawing/2014/main" id="{1E9E2E18-6C5F-7D61-E70F-B57BE2F70E9E}"/>
               </a:ext>
             </a:extLst>
           </p:cNvPr>
           <p:cNvCxnSpPr>
             <a:cxnSpLocks/>
-            <a:stCxn id="61" idx="2"/>
+            <a:endCxn id="89" idx="2"/>
           </p:cNvCxnSpPr>
           <p:nvPr/>
         </p:nvCxnSpPr>
         <p:spPr>
-          <a:xfrm flipH="1">
-            <a:off x="4695777" y="1929071"/>
-            <a:ext cx="3016839" cy="2392393"/>
+          <a:xfrm flipV="1">
+            <a:off x="3050184" y="1360908"/>
+            <a:ext cx="720179" cy="0"/>
           </a:xfrm>
           <a:prstGeom prst="straightConnector1">
             <a:avLst/>
@@ -12243,193 +12957,26 @@
           </a:fontRef>
         </p:style>
       </p:cxnSp>
-      <p:sp>
-        <p:nvSpPr>
-          <p:cNvPr id="66" name="ZoneTexte 65">
-            <a:extLst>
-              <a:ext uri="{FF2B5EF4-FFF2-40B4-BE49-F238E27FC236}">
-                <a16:creationId xmlns:a16="http://schemas.microsoft.com/office/drawing/2014/main" id="{65505339-83D5-FB05-E559-CD94414AC7E4}"/>
-              </a:ext>
-            </a:extLst>
-          </p:cNvPr>
-          <p:cNvSpPr txBox="1"/>
-          <p:nvPr/>
-        </p:nvSpPr>
-        <p:spPr>
-          <a:xfrm>
-            <a:off x="141834" y="5791200"/>
-            <a:ext cx="2451100" cy="369332"/>
-          </a:xfrm>
-          <a:prstGeom prst="rect">
-            <a:avLst/>
-          </a:prstGeom>
-          <a:noFill/>
-        </p:spPr>
-        <p:txBody>
-          <a:bodyPr wrap="square" rtlCol="0">
-            <a:spAutoFit/>
-          </a:bodyPr>
-          <a:lstStyle/>
-          <a:p>
-            <a:r>
-              <a:rPr lang="fr-FR" b="1" dirty="0" err="1"/>
-              <a:t>Observed</a:t>
-            </a:r>
-            <a:r>
-              <a:rPr lang="fr-FR" b="1" dirty="0"/>
-              <a:t> data</a:t>
-            </a:r>
-          </a:p>
-        </p:txBody>
-      </p:sp>
-      <p:sp>
-        <p:nvSpPr>
-          <p:cNvPr id="67" name="ZoneTexte 66">
-            <a:extLst>
-              <a:ext uri="{FF2B5EF4-FFF2-40B4-BE49-F238E27FC236}">
-                <a16:creationId xmlns:a16="http://schemas.microsoft.com/office/drawing/2014/main" id="{8176EA08-80AF-2709-5EF7-ABEB76C5B861}"/>
-              </a:ext>
-            </a:extLst>
-          </p:cNvPr>
-          <p:cNvSpPr txBox="1"/>
-          <p:nvPr/>
-        </p:nvSpPr>
-        <p:spPr>
-          <a:xfrm>
-            <a:off x="156053" y="4102285"/>
-            <a:ext cx="1612864" cy="369332"/>
-          </a:xfrm>
-          <a:prstGeom prst="rect">
-            <a:avLst/>
-          </a:prstGeom>
-          <a:noFill/>
-        </p:spPr>
-        <p:txBody>
-          <a:bodyPr wrap="square" rtlCol="0">
-            <a:spAutoFit/>
-          </a:bodyPr>
-          <a:lstStyle/>
-          <a:p>
-            <a:r>
-              <a:rPr lang="fr-FR" b="1" dirty="0"/>
-              <a:t>Risk model</a:t>
-            </a:r>
-          </a:p>
-        </p:txBody>
-      </p:sp>
-      <p:sp>
-        <p:nvSpPr>
-          <p:cNvPr id="68" name="ZoneTexte 67">
-            <a:extLst>
-              <a:ext uri="{FF2B5EF4-FFF2-40B4-BE49-F238E27FC236}">
-                <a16:creationId xmlns:a16="http://schemas.microsoft.com/office/drawing/2014/main" id="{0A5A7161-5B6D-979B-E9AB-F93FB2A348C5}"/>
-              </a:ext>
-            </a:extLst>
-          </p:cNvPr>
-          <p:cNvSpPr txBox="1"/>
-          <p:nvPr/>
-        </p:nvSpPr>
-        <p:spPr>
-          <a:xfrm>
-            <a:off x="87208" y="2413185"/>
-            <a:ext cx="2120495" cy="646331"/>
-          </a:xfrm>
-          <a:prstGeom prst="rect">
-            <a:avLst/>
-          </a:prstGeom>
-          <a:noFill/>
-        </p:spPr>
-        <p:txBody>
-          <a:bodyPr wrap="square" rtlCol="0">
-            <a:spAutoFit/>
-          </a:bodyPr>
-          <a:lstStyle/>
-          <a:p>
-            <a:r>
-              <a:rPr lang="fr-FR" b="1" dirty="0"/>
-              <a:t>Spatial </a:t>
-            </a:r>
-          </a:p>
-          <a:p>
-            <a:r>
-              <a:rPr lang="fr-FR" b="1" dirty="0" err="1"/>
-              <a:t>random</a:t>
-            </a:r>
-            <a:r>
-              <a:rPr lang="fr-FR" b="1" dirty="0"/>
-              <a:t> </a:t>
-            </a:r>
-            <a:r>
-              <a:rPr lang="fr-FR" b="1" dirty="0" err="1"/>
-              <a:t>effects</a:t>
-            </a:r>
-            <a:endParaRPr lang="fr-FR" b="1" dirty="0"/>
-          </a:p>
-        </p:txBody>
-      </p:sp>
-      <p:sp>
-        <p:nvSpPr>
-          <p:cNvPr id="69" name="ZoneTexte 68">
-            <a:extLst>
-              <a:ext uri="{FF2B5EF4-FFF2-40B4-BE49-F238E27FC236}">
-                <a16:creationId xmlns:a16="http://schemas.microsoft.com/office/drawing/2014/main" id="{6BE50881-75E5-6E36-3C26-FF58BA8530F9}"/>
-              </a:ext>
-            </a:extLst>
-          </p:cNvPr>
-          <p:cNvSpPr txBox="1"/>
-          <p:nvPr/>
-        </p:nvSpPr>
-        <p:spPr>
-          <a:xfrm>
-            <a:off x="137428" y="333032"/>
-            <a:ext cx="2120495" cy="646331"/>
-          </a:xfrm>
-          <a:prstGeom prst="rect">
-            <a:avLst/>
-          </a:prstGeom>
-          <a:noFill/>
-        </p:spPr>
-        <p:txBody>
-          <a:bodyPr wrap="square" rtlCol="0">
-            <a:spAutoFit/>
-          </a:bodyPr>
-          <a:lstStyle/>
-          <a:p>
-            <a:r>
-              <a:rPr lang="fr-FR" b="1" dirty="0" err="1"/>
-              <a:t>Parameters</a:t>
-            </a:r>
-            <a:r>
-              <a:rPr lang="fr-FR" b="1" dirty="0"/>
-              <a:t> and </a:t>
-            </a:r>
-            <a:r>
-              <a:rPr lang="fr-FR" b="1" dirty="0" err="1"/>
-              <a:t>hyperparameters</a:t>
-            </a:r>
-            <a:endParaRPr lang="fr-FR" b="1" dirty="0"/>
-          </a:p>
-        </p:txBody>
-      </p:sp>
       <p:cxnSp>
         <p:nvCxnSpPr>
-          <p:cNvPr id="75" name="Connecteur droit avec flèche 74">
-            <a:extLst>
-              <a:ext uri="{FF2B5EF4-FFF2-40B4-BE49-F238E27FC236}">
-                <a16:creationId xmlns:a16="http://schemas.microsoft.com/office/drawing/2014/main" id="{82A3F282-6286-A640-3B5D-B0A17ADF14B1}"/>
+          <p:cNvPr id="130" name="Connecteur droit avec flèche 129">
+            <a:extLst>
+              <a:ext uri="{FF2B5EF4-FFF2-40B4-BE49-F238E27FC236}">
+                <a16:creationId xmlns:a16="http://schemas.microsoft.com/office/drawing/2014/main" id="{349D6A00-4400-0177-4980-FC0DE1C55FBA}"/>
               </a:ext>
             </a:extLst>
           </p:cNvPr>
           <p:cNvCxnSpPr>
             <a:cxnSpLocks/>
-            <a:stCxn id="48" idx="2"/>
+            <a:stCxn id="89" idx="3"/>
+            <a:endCxn id="123" idx="7"/>
           </p:cNvCxnSpPr>
           <p:nvPr/>
         </p:nvCxnSpPr>
         <p:spPr>
           <a:xfrm flipH="1">
-            <a:off x="4975177" y="1780738"/>
-            <a:ext cx="473125" cy="945911"/>
+            <a:off x="2151730" y="1565121"/>
+            <a:ext cx="1720156" cy="1327714"/>
           </a:xfrm>
           <a:prstGeom prst="straightConnector1">
             <a:avLst/>
@@ -12458,75 +13005,32 @@
       </p:cxnSp>
       <p:cxnSp>
         <p:nvCxnSpPr>
-          <p:cNvPr id="79" name="Connecteur droit 78">
-            <a:extLst>
-              <a:ext uri="{FF2B5EF4-FFF2-40B4-BE49-F238E27FC236}">
-                <a16:creationId xmlns:a16="http://schemas.microsoft.com/office/drawing/2014/main" id="{3BA524BD-1008-EB42-E242-731CC18B434A}"/>
+          <p:cNvPr id="133" name="Connecteur droit avec flèche 132">
+            <a:extLst>
+              <a:ext uri="{FF2B5EF4-FFF2-40B4-BE49-F238E27FC236}">
+                <a16:creationId xmlns:a16="http://schemas.microsoft.com/office/drawing/2014/main" id="{4ADF5C1A-43C3-5759-ACAE-B87E433F1695}"/>
               </a:ext>
             </a:extLst>
           </p:cNvPr>
           <p:cNvCxnSpPr>
             <a:cxnSpLocks/>
+            <a:stCxn id="90" idx="5"/>
           </p:cNvCxnSpPr>
           <p:nvPr/>
         </p:nvCxnSpPr>
         <p:spPr>
           <a:xfrm>
-            <a:off x="156053" y="4012665"/>
-            <a:ext cx="10638947" cy="1917"/>
-          </a:xfrm>
-          <a:prstGeom prst="line">
+            <a:off x="5354444" y="1578651"/>
+            <a:ext cx="1532735" cy="489724"/>
+          </a:xfrm>
+          <a:prstGeom prst="straightConnector1">
             <a:avLst/>
           </a:prstGeom>
           <a:ln w="9525">
             <a:solidFill>
               <a:schemeClr val="tx1"/>
             </a:solidFill>
-            <a:prstDash val="dash"/>
-          </a:ln>
-        </p:spPr>
-        <p:style>
-          <a:lnRef idx="2">
-            <a:schemeClr val="accent1"/>
-          </a:lnRef>
-          <a:fillRef idx="0">
-            <a:schemeClr val="accent1"/>
-          </a:fillRef>
-          <a:effectRef idx="1">
-            <a:schemeClr val="accent1"/>
-          </a:effectRef>
-          <a:fontRef idx="minor">
-            <a:schemeClr val="tx1"/>
-          </a:fontRef>
-        </p:style>
-      </p:cxnSp>
-      <p:cxnSp>
-        <p:nvCxnSpPr>
-          <p:cNvPr id="80" name="Connecteur droit 79">
-            <a:extLst>
-              <a:ext uri="{FF2B5EF4-FFF2-40B4-BE49-F238E27FC236}">
-                <a16:creationId xmlns:a16="http://schemas.microsoft.com/office/drawing/2014/main" id="{8848B72F-14C9-EB67-C66F-7643E93CA27E}"/>
-              </a:ext>
-            </a:extLst>
-          </p:cNvPr>
-          <p:cNvCxnSpPr>
-            <a:cxnSpLocks/>
-          </p:cNvCxnSpPr>
-          <p:nvPr/>
-        </p:nvCxnSpPr>
-        <p:spPr>
-          <a:xfrm>
-            <a:off x="230426" y="5739091"/>
-            <a:ext cx="10638947" cy="1917"/>
-          </a:xfrm>
-          <a:prstGeom prst="line">
-            <a:avLst/>
-          </a:prstGeom>
-          <a:ln w="9525">
-            <a:solidFill>
-              <a:schemeClr val="tx1"/>
-            </a:solidFill>
-            <a:prstDash val="dash"/>
+            <a:tailEnd type="triangle"/>
           </a:ln>
         </p:spPr>
         <p:style>

</xml_diff>